<commit_message>
add slide about integration
</commit_message>
<xml_diff>
--- a/.net core bcn user group.pptx
+++ b/.net core bcn user group.pptx
@@ -5,7 +5,7 @@
     <p:sldMasterId id="2147483648" r:id="rId1"/>
   </p:sldMasterIdLst>
   <p:notesMasterIdLst>
-    <p:notesMasterId r:id="rId38"/>
+    <p:notesMasterId r:id="rId35"/>
   </p:notesMasterIdLst>
   <p:sldIdLst>
     <p:sldId id="256" r:id="rId2"/>
@@ -15,35 +15,32 @@
     <p:sldId id="263" r:id="rId6"/>
     <p:sldId id="264" r:id="rId7"/>
     <p:sldId id="265" r:id="rId8"/>
-    <p:sldId id="266" r:id="rId9"/>
-    <p:sldId id="267" r:id="rId10"/>
-    <p:sldId id="268" r:id="rId11"/>
-    <p:sldId id="269" r:id="rId12"/>
-    <p:sldId id="270" r:id="rId13"/>
-    <p:sldId id="259" r:id="rId14"/>
-    <p:sldId id="273" r:id="rId15"/>
-    <p:sldId id="271" r:id="rId16"/>
-    <p:sldId id="272" r:id="rId17"/>
-    <p:sldId id="274" r:id="rId18"/>
-    <p:sldId id="275" r:id="rId19"/>
-    <p:sldId id="276" r:id="rId20"/>
-    <p:sldId id="277" r:id="rId21"/>
-    <p:sldId id="278" r:id="rId22"/>
-    <p:sldId id="279" r:id="rId23"/>
-    <p:sldId id="280" r:id="rId24"/>
-    <p:sldId id="281" r:id="rId25"/>
-    <p:sldId id="282" r:id="rId26"/>
-    <p:sldId id="283" r:id="rId27"/>
-    <p:sldId id="284" r:id="rId28"/>
-    <p:sldId id="285" r:id="rId29"/>
-    <p:sldId id="286" r:id="rId30"/>
-    <p:sldId id="287" r:id="rId31"/>
-    <p:sldId id="288" r:id="rId32"/>
-    <p:sldId id="289" r:id="rId33"/>
-    <p:sldId id="290" r:id="rId34"/>
-    <p:sldId id="291" r:id="rId35"/>
-    <p:sldId id="292" r:id="rId36"/>
-    <p:sldId id="293" r:id="rId37"/>
+    <p:sldId id="267" r:id="rId9"/>
+    <p:sldId id="268" r:id="rId10"/>
+    <p:sldId id="269" r:id="rId11"/>
+    <p:sldId id="270" r:id="rId12"/>
+    <p:sldId id="259" r:id="rId13"/>
+    <p:sldId id="271" r:id="rId14"/>
+    <p:sldId id="272" r:id="rId15"/>
+    <p:sldId id="274" r:id="rId16"/>
+    <p:sldId id="275" r:id="rId17"/>
+    <p:sldId id="276" r:id="rId18"/>
+    <p:sldId id="277" r:id="rId19"/>
+    <p:sldId id="279" r:id="rId20"/>
+    <p:sldId id="280" r:id="rId21"/>
+    <p:sldId id="294" r:id="rId22"/>
+    <p:sldId id="289" r:id="rId23"/>
+    <p:sldId id="282" r:id="rId24"/>
+    <p:sldId id="283" r:id="rId25"/>
+    <p:sldId id="284" r:id="rId26"/>
+    <p:sldId id="285" r:id="rId27"/>
+    <p:sldId id="286" r:id="rId28"/>
+    <p:sldId id="287" r:id="rId29"/>
+    <p:sldId id="288" r:id="rId30"/>
+    <p:sldId id="290" r:id="rId31"/>
+    <p:sldId id="291" r:id="rId32"/>
+    <p:sldId id="292" r:id="rId33"/>
+    <p:sldId id="293" r:id="rId34"/>
   </p:sldIdLst>
   <p:sldSz cx="12192000" cy="6858000"/>
   <p:notesSz cx="6858000" cy="9144000"/>
@@ -232,7 +229,7 @@
           <a:p>
             <a:fld id="{3D98074C-C7EE-48EE-BDB5-59A8538F2CA9}" type="datetimeFigureOut">
               <a:rPr lang="en-US" smtClean="0"/>
-              <a:t>1/23/2019</a:t>
+              <a:t>1/24/2019</a:t>
             </a:fld>
             <a:endParaRPr lang="en-US"/>
           </a:p>
@@ -670,51 +667,11 @@
           <a:p>
             <a:r>
               <a:rPr lang="en-GB" dirty="0" smtClean="0"/>
-              <a:t>We received a phone</a:t>
+              <a:t>So</a:t>
             </a:r>
             <a:r>
               <a:rPr lang="en-GB" baseline="0" dirty="0" smtClean="0"/>
-              <a:t> call from our Project Director, let’s call him Mr. S.</a:t>
-            </a:r>
-          </a:p>
-          <a:p>
-            <a:pPr marL="171450" indent="-171450">
-              <a:buFontTx/>
-              <a:buChar char="-"/>
-            </a:pPr>
-            <a:r>
-              <a:rPr lang="en-GB" baseline="0" dirty="0" smtClean="0"/>
-              <a:t>Hello guys, I have done a few demos to some departments and they love the solution that we are building.</a:t>
-            </a:r>
-          </a:p>
-          <a:p>
-            <a:pPr marL="171450" indent="-171450">
-              <a:buFontTx/>
-              <a:buChar char="-"/>
-            </a:pPr>
-            <a:r>
-              <a:rPr lang="en-GB" baseline="0" dirty="0" smtClean="0"/>
-              <a:t>Yeah that’s amazing!</a:t>
-            </a:r>
-          </a:p>
-          <a:p>
-            <a:pPr marL="171450" indent="-171450">
-              <a:buFontTx/>
-              <a:buChar char="-"/>
-            </a:pPr>
-            <a:r>
-              <a:rPr lang="en-GB" baseline="0" dirty="0" smtClean="0"/>
-              <a:t>So we have to start planning the production environment and open it to people.</a:t>
-            </a:r>
-          </a:p>
-          <a:p>
-            <a:pPr marL="171450" indent="-171450">
-              <a:buFontTx/>
-              <a:buChar char="-"/>
-            </a:pPr>
-            <a:r>
-              <a:rPr lang="en-GB" baseline="0" dirty="0" smtClean="0"/>
-              <a:t>What?!!?? </a:t>
+              <a:t> we were panicking for a while, but our technical lead, let’s called him Mr. D. came with a few motivational sentences from I guess Paulo Coelho or some kind of cheap business school. The typical this is not a problem this is an opportunity to shine. This is what we have been waiting, etc. So we arrange a technical meeting and decided what we need to put our solution in production. During this meeting someone suggested that we needed some kind of monitoring system to check the health of our solution. In this kind of meeting you feel like you have to say something and because I was quiet during the meeting suddenly my brain had some kind of shortcut and I said OK, I can do that. Even though I never had implemented any kind of monitoring system. So after the meeting I did what any decent person would have done.</a:t>
             </a:r>
             <a:endParaRPr lang="en-US" dirty="0"/>
           </a:p>
@@ -746,7 +703,7 @@
     </p:spTree>
     <p:extLst>
       <p:ext uri="{BB962C8B-B14F-4D97-AF65-F5344CB8AC3E}">
-        <p14:creationId xmlns:p14="http://schemas.microsoft.com/office/powerpoint/2010/main" val="1416724521"/>
+        <p14:creationId xmlns:p14="http://schemas.microsoft.com/office/powerpoint/2010/main" val="1627088273"/>
       </p:ext>
     </p:extLst>
   </p:cSld>
@@ -802,11 +759,11 @@
           <a:p>
             <a:r>
               <a:rPr lang="en-GB" dirty="0" smtClean="0"/>
-              <a:t>So</a:t>
+              <a:t>Hold on a second</a:t>
             </a:r>
             <a:r>
               <a:rPr lang="en-GB" baseline="0" dirty="0" smtClean="0"/>
-              <a:t> we were panicking for a while, but our technical lead, let’s called him Mr. D. came with a few motivational sentences from I guess Paulo Coelho or some kind of cheap business school. The typical this is not a problem this is an opportunity to shine. This is what we have been waiting, etc. So we arrange a technical meeting and decided what we need to put our solution in production. During this meeting someone suggested that we needed some kind of monitoring system to check the health of our solution. In this kind of meeting you feel like you have to say something and because I was quiet during the meeting suddenly my brain had some kind of shortcut and I said OK, I can do that. Even though I never had implemented any kind of monitoring system. So after the meeting I did what any decent person would have done.</a:t>
+              <a:t>, I think this is the second thing I did. The first thing I did was to look for what the hell monitoring means…</a:t>
             </a:r>
             <a:endParaRPr lang="en-US" dirty="0"/>
           </a:p>
@@ -838,7 +795,7 @@
     </p:spTree>
     <p:extLst>
       <p:ext uri="{BB962C8B-B14F-4D97-AF65-F5344CB8AC3E}">
-        <p14:creationId xmlns:p14="http://schemas.microsoft.com/office/powerpoint/2010/main" val="1627088273"/>
+        <p14:creationId xmlns:p14="http://schemas.microsoft.com/office/powerpoint/2010/main" val="1021888965"/>
       </p:ext>
     </p:extLst>
   </p:cSld>
@@ -892,15 +849,30 @@
           <a:bodyPr/>
           <a:lstStyle/>
           <a:p>
-            <a:r>
-              <a:rPr lang="en-GB" dirty="0" smtClean="0"/>
-              <a:t>Hold on a second</a:t>
-            </a:r>
+            <a:pPr marL="0" indent="0">
+              <a:buFontTx/>
+              <a:buNone/>
+            </a:pPr>
             <a:r>
               <a:rPr lang="en-GB" baseline="0" dirty="0" smtClean="0"/>
-              <a:t>, I think this is the second thing I did. The first thing I did was to look for what the hell monitoring means…</a:t>
-            </a:r>
-            <a:endParaRPr lang="en-US" dirty="0"/>
+              <a:t>I came with the Cambridge Dictionary definition. “</a:t>
+            </a:r>
+            <a:r>
+              <a:rPr lang="en-GB" i="1" baseline="0" dirty="0" smtClean="0"/>
+              <a:t>To watch and check a situation carefully for a period of time in order to discover something about it</a:t>
+            </a:r>
+            <a:r>
+              <a:rPr lang="en-GB" baseline="0" dirty="0" smtClean="0"/>
+              <a:t>”. This definition is so interesting and it is what we wanted to do. Check our system for a period of time to check if it was behaving properly. Anyway, after a few searches in google and reading a bit in </a:t>
+            </a:r>
+            <a:r>
+              <a:rPr lang="en-GB" baseline="0" dirty="0" err="1" smtClean="0"/>
+              <a:t>Stackoverflow</a:t>
+            </a:r>
+            <a:r>
+              <a:rPr lang="en-GB" baseline="0" dirty="0" smtClean="0"/>
+              <a:t>, I don’t think I went to the second page in Google, I discovered an open source solution that is being adopted for many companies and organizations in our industry. I would like to welcome Prometheus!</a:t>
+            </a:r>
           </a:p>
         </p:txBody>
       </p:sp>
@@ -930,7 +902,7 @@
     </p:spTree>
     <p:extLst>
       <p:ext uri="{BB962C8B-B14F-4D97-AF65-F5344CB8AC3E}">
-        <p14:creationId xmlns:p14="http://schemas.microsoft.com/office/powerpoint/2010/main" val="1021888965"/>
+        <p14:creationId xmlns:p14="http://schemas.microsoft.com/office/powerpoint/2010/main" val="4269865030"/>
       </p:ext>
     </p:extLst>
   </p:cSld>
@@ -989,25 +961,18 @@
               <a:buNone/>
             </a:pPr>
             <a:r>
-              <a:rPr lang="en-GB" baseline="0" dirty="0" smtClean="0"/>
-              <a:t>I came with the Cambridge Dictionary definition. “</a:t>
-            </a:r>
-            <a:r>
-              <a:rPr lang="en-GB" i="1" baseline="0" dirty="0" smtClean="0"/>
-              <a:t>To watch and check a situation carefully for a period of time in order to discover something about it</a:t>
-            </a:r>
-            <a:r>
-              <a:rPr lang="en-GB" baseline="0" dirty="0" smtClean="0"/>
-              <a:t>”. This definition is so interesting and it is what we wanted to do. Check our system for a period of time to check if it was behaving properly. Anyway, after a few searches in google and reading a bit in </a:t>
-            </a:r>
-            <a:r>
-              <a:rPr lang="en-GB" baseline="0" dirty="0" err="1" smtClean="0"/>
-              <a:t>Stackoverflow</a:t>
-            </a:r>
-            <a:r>
-              <a:rPr lang="en-GB" baseline="0" dirty="0" smtClean="0"/>
-              <a:t>, I don’t think I went to the second page in Google, I discovered an open source solution that is being adopted for many companies and organizations in our industry. I would like to welcome Prometheus!</a:t>
-            </a:r>
+              <a:rPr lang="en-GB" sz="1200" b="0" i="0" u="none" strike="noStrike" kern="1200" baseline="0" dirty="0" smtClean="0">
+                <a:solidFill>
+                  <a:schemeClr val="tx1"/>
+                </a:solidFill>
+                <a:effectLst/>
+                <a:latin typeface="+mn-lt"/>
+                <a:ea typeface="+mn-ea"/>
+                <a:cs typeface="+mn-cs"/>
+              </a:rPr>
+              <a:t>Prometheus is a monitoring system. It collects metrics from configured targets at given intervals, evaluates rule expressions, display the results, and can trigger alerts if some condition is observed to be true.</a:t>
+            </a:r>
+            <a:endParaRPr lang="en-GB" baseline="0" dirty="0" smtClean="0"/>
           </a:p>
         </p:txBody>
       </p:sp>
@@ -1037,7 +1002,7 @@
     </p:spTree>
     <p:extLst>
       <p:ext uri="{BB962C8B-B14F-4D97-AF65-F5344CB8AC3E}">
-        <p14:creationId xmlns:p14="http://schemas.microsoft.com/office/powerpoint/2010/main" val="4269865030"/>
+        <p14:creationId xmlns:p14="http://schemas.microsoft.com/office/powerpoint/2010/main" val="2415023573"/>
       </p:ext>
     </p:extLst>
   </p:cSld>
@@ -1091,31 +1056,38 @@
           <a:bodyPr/>
           <a:lstStyle/>
           <a:p>
-            <a:r>
-              <a:rPr lang="en-GB" dirty="0" smtClean="0"/>
-              <a:t>Sorry,</a:t>
-            </a:r>
+            <a:pPr marL="0" indent="0">
+              <a:buFontTx/>
+              <a:buNone/>
+            </a:pPr>
             <a:r>
               <a:rPr lang="en-GB" baseline="0" dirty="0" smtClean="0"/>
-              <a:t> just before to introduce Prometheus, t</a:t>
-            </a:r>
-            <a:r>
-              <a:rPr lang="en-GB" dirty="0" smtClean="0"/>
-              <a:t>his is Suzy</a:t>
+              <a:t>Prometheus collect metrics from job exporters, either directly o via a intermediary push gateway, I have never used this </a:t>
+            </a:r>
+            <a:r>
+              <a:rPr lang="en-GB" baseline="0" dirty="0" err="1" smtClean="0"/>
+              <a:t>pushgateway</a:t>
             </a:r>
             <a:r>
               <a:rPr lang="en-GB" baseline="0" dirty="0" smtClean="0"/>
-              <a:t> Sheep, </a:t>
+              <a:t>, so please don’t ask any questions about it. It store all this data that collects locally and runs rules over this data to aggregate or generate alerts. We can use Prometheus web UI to visualize this data or we can use data visualization tools like </a:t>
             </a:r>
             <a:r>
               <a:rPr lang="en-GB" baseline="0" dirty="0" err="1" smtClean="0"/>
-              <a:t>Peppa’s</a:t>
+              <a:t>grafana</a:t>
             </a:r>
             <a:r>
               <a:rPr lang="en-GB" baseline="0" dirty="0" smtClean="0"/>
-              <a:t> best friend. So now, PROMETHEUS!</a:t>
-            </a:r>
-            <a:endParaRPr lang="en-US" dirty="0"/>
+              <a:t>. Let’s give a nice welcome to </a:t>
+            </a:r>
+            <a:r>
+              <a:rPr lang="en-GB" baseline="0" dirty="0" err="1" smtClean="0"/>
+              <a:t>Grafana</a:t>
+            </a:r>
+            <a:r>
+              <a:rPr lang="en-GB" baseline="0" dirty="0" smtClean="0"/>
+              <a:t>, Prometheus best friend.</a:t>
+            </a:r>
           </a:p>
         </p:txBody>
       </p:sp>
@@ -1145,7 +1117,7 @@
     </p:spTree>
     <p:extLst>
       <p:ext uri="{BB962C8B-B14F-4D97-AF65-F5344CB8AC3E}">
-        <p14:creationId xmlns:p14="http://schemas.microsoft.com/office/powerpoint/2010/main" val="68722035"/>
+        <p14:creationId xmlns:p14="http://schemas.microsoft.com/office/powerpoint/2010/main" val="1460200977"/>
       </p:ext>
     </p:extLst>
   </p:cSld>
@@ -1204,7 +1176,7 @@
               <a:buNone/>
             </a:pPr>
             <a:r>
-              <a:rPr lang="en-GB" sz="1200" b="0" i="0" u="none" strike="noStrike" kern="1200" baseline="0" dirty="0" smtClean="0">
+              <a:rPr lang="en-US" sz="1200" b="0" i="0" kern="1200" dirty="0" err="1" smtClean="0">
                 <a:solidFill>
                   <a:schemeClr val="tx1"/>
                 </a:solidFill>
@@ -1213,7 +1185,91 @@
                 <a:ea typeface="+mn-ea"/>
                 <a:cs typeface="+mn-cs"/>
               </a:rPr>
-              <a:t>Prometheus is a monitoring system. It collects metrics from configured targets at given intervals, evaluates rule expressions, display the results, and can trigger alerts if some condition is observed to be true.</a:t>
+              <a:t>Grafana</a:t>
+            </a:r>
+            <a:r>
+              <a:rPr lang="en-US" sz="1200" b="0" i="0" kern="1200" dirty="0" smtClean="0">
+                <a:solidFill>
+                  <a:schemeClr val="tx1"/>
+                </a:solidFill>
+                <a:effectLst/>
+                <a:latin typeface="+mn-lt"/>
+                <a:ea typeface="+mn-ea"/>
+                <a:cs typeface="+mn-cs"/>
+              </a:rPr>
+              <a:t> is an open source, feature rich metrics dashboard and graph editor for Graphite, </a:t>
+            </a:r>
+            <a:r>
+              <a:rPr lang="en-US" sz="1200" b="0" i="0" kern="1200" dirty="0" err="1" smtClean="0">
+                <a:solidFill>
+                  <a:schemeClr val="tx1"/>
+                </a:solidFill>
+                <a:effectLst/>
+                <a:latin typeface="+mn-lt"/>
+                <a:ea typeface="+mn-ea"/>
+                <a:cs typeface="+mn-cs"/>
+              </a:rPr>
+              <a:t>Elasticsearch</a:t>
+            </a:r>
+            <a:r>
+              <a:rPr lang="en-US" sz="1200" b="0" i="0" kern="1200" dirty="0" smtClean="0">
+                <a:solidFill>
+                  <a:schemeClr val="tx1"/>
+                </a:solidFill>
+                <a:effectLst/>
+                <a:latin typeface="+mn-lt"/>
+                <a:ea typeface="+mn-ea"/>
+                <a:cs typeface="+mn-cs"/>
+              </a:rPr>
+              <a:t>, </a:t>
+            </a:r>
+            <a:r>
+              <a:rPr lang="en-US" sz="1200" b="0" i="0" kern="1200" dirty="0" err="1" smtClean="0">
+                <a:solidFill>
+                  <a:schemeClr val="tx1"/>
+                </a:solidFill>
+                <a:effectLst/>
+                <a:latin typeface="+mn-lt"/>
+                <a:ea typeface="+mn-ea"/>
+                <a:cs typeface="+mn-cs"/>
+              </a:rPr>
+              <a:t>OpenTSDB</a:t>
+            </a:r>
+            <a:r>
+              <a:rPr lang="en-US" sz="1200" b="0" i="0" kern="1200" dirty="0" smtClean="0">
+                <a:solidFill>
+                  <a:schemeClr val="tx1"/>
+                </a:solidFill>
+                <a:effectLst/>
+                <a:latin typeface="+mn-lt"/>
+                <a:ea typeface="+mn-ea"/>
+                <a:cs typeface="+mn-cs"/>
+              </a:rPr>
+              <a:t>, Prometheus and </a:t>
+            </a:r>
+            <a:r>
+              <a:rPr lang="en-US" sz="1200" b="0" i="0" kern="1200" dirty="0" err="1" smtClean="0">
+                <a:solidFill>
+                  <a:schemeClr val="tx1"/>
+                </a:solidFill>
+                <a:effectLst/>
+                <a:latin typeface="+mn-lt"/>
+                <a:ea typeface="+mn-ea"/>
+                <a:cs typeface="+mn-cs"/>
+              </a:rPr>
+              <a:t>InfluxDB</a:t>
+            </a:r>
+            <a:r>
+              <a:rPr lang="en-US" sz="1200" b="0" i="0" kern="1200" dirty="0" smtClean="0">
+                <a:solidFill>
+                  <a:schemeClr val="tx1"/>
+                </a:solidFill>
+                <a:effectLst/>
+                <a:latin typeface="+mn-lt"/>
+                <a:ea typeface="+mn-ea"/>
+                <a:cs typeface="+mn-cs"/>
+              </a:rPr>
+              <a:t>.</a:t>
             </a:r>
             <a:endParaRPr lang="en-GB" baseline="0" dirty="0" smtClean="0"/>
           </a:p>
@@ -1245,7 +1301,7 @@
     </p:spTree>
     <p:extLst>
       <p:ext uri="{BB962C8B-B14F-4D97-AF65-F5344CB8AC3E}">
-        <p14:creationId xmlns:p14="http://schemas.microsoft.com/office/powerpoint/2010/main" val="2415023573"/>
+        <p14:creationId xmlns:p14="http://schemas.microsoft.com/office/powerpoint/2010/main" val="2007484448"/>
       </p:ext>
     </p:extLst>
   </p:cSld>
@@ -1304,33 +1360,114 @@
               <a:buNone/>
             </a:pPr>
             <a:r>
-              <a:rPr lang="en-GB" baseline="0" dirty="0" smtClean="0"/>
-              <a:t>Prometheus collect metrics from job exporters, either directly o via a intermediary push gateway, I have never used this </a:t>
-            </a:r>
-            <a:r>
-              <a:rPr lang="en-GB" baseline="0" dirty="0" err="1" smtClean="0"/>
-              <a:t>pushgateway</a:t>
-            </a:r>
-            <a:r>
-              <a:rPr lang="en-GB" baseline="0" dirty="0" smtClean="0"/>
-              <a:t>, so please don’t ask any questions about it. It store all this data that collects locally and runs rules over this data to aggregate or generate alerts. We can use Prometheus web UI to visualize this data or we can use data visualization tools like </a:t>
-            </a:r>
-            <a:r>
-              <a:rPr lang="en-GB" baseline="0" dirty="0" err="1" smtClean="0"/>
-              <a:t>grafana</a:t>
-            </a:r>
-            <a:r>
-              <a:rPr lang="en-GB" baseline="0" dirty="0" smtClean="0"/>
-              <a:t>. Let’s give a nice welcome to </a:t>
-            </a:r>
-            <a:r>
-              <a:rPr lang="en-GB" baseline="0" dirty="0" err="1" smtClean="0"/>
+              <a:rPr lang="en-GB" sz="1200" b="0" i="0" kern="1200" baseline="0" dirty="0" smtClean="0">
+                <a:solidFill>
+                  <a:schemeClr val="tx1"/>
+                </a:solidFill>
+                <a:effectLst/>
+                <a:latin typeface="+mn-lt"/>
+                <a:ea typeface="+mn-ea"/>
+                <a:cs typeface="+mn-cs"/>
+              </a:rPr>
+              <a:t>One of the key points of adopting </a:t>
+            </a:r>
+            <a:r>
+              <a:rPr lang="en-GB" sz="1200" b="0" i="0" kern="1200" baseline="0" dirty="0" err="1" smtClean="0">
+                <a:solidFill>
+                  <a:schemeClr val="tx1"/>
+                </a:solidFill>
+                <a:effectLst/>
+                <a:latin typeface="+mn-lt"/>
+                <a:ea typeface="+mn-ea"/>
+                <a:cs typeface="+mn-cs"/>
+              </a:rPr>
               <a:t>Grafana</a:t>
             </a:r>
             <a:r>
-              <a:rPr lang="en-GB" baseline="0" dirty="0" smtClean="0"/>
-              <a:t>, Prometheus best friend.</a:t>
-            </a:r>
+              <a:rPr lang="en-GB" sz="1200" b="0" i="0" kern="1200" baseline="0" dirty="0" smtClean="0">
+                <a:solidFill>
+                  <a:schemeClr val="tx1"/>
+                </a:solidFill>
+                <a:effectLst/>
+                <a:latin typeface="+mn-lt"/>
+                <a:ea typeface="+mn-ea"/>
+                <a:cs typeface="+mn-cs"/>
+              </a:rPr>
+              <a:t> is how easy is to build a spot on dashboard. Basically you add one or several panels, each of one configured with one </a:t>
+            </a:r>
+            <a:r>
+              <a:rPr lang="en-GB" sz="1200" b="0" i="0" kern="1200" baseline="0" dirty="0" err="1" smtClean="0">
+                <a:solidFill>
+                  <a:schemeClr val="tx1"/>
+                </a:solidFill>
+                <a:effectLst/>
+                <a:latin typeface="+mn-lt"/>
+                <a:ea typeface="+mn-ea"/>
+                <a:cs typeface="+mn-cs"/>
+              </a:rPr>
+              <a:t>datasource</a:t>
+            </a:r>
+            <a:r>
+              <a:rPr lang="en-GB" sz="1200" b="0" i="0" kern="1200" baseline="0" dirty="0" smtClean="0">
+                <a:solidFill>
+                  <a:schemeClr val="tx1"/>
+                </a:solidFill>
+                <a:effectLst/>
+                <a:latin typeface="+mn-lt"/>
+                <a:ea typeface="+mn-ea"/>
+                <a:cs typeface="+mn-cs"/>
+              </a:rPr>
+              <a:t>, in our case always Prometheus as </a:t>
+            </a:r>
+            <a:r>
+              <a:rPr lang="en-GB" sz="1200" b="0" i="0" kern="1200" baseline="0" dirty="0" err="1" smtClean="0">
+                <a:solidFill>
+                  <a:schemeClr val="tx1"/>
+                </a:solidFill>
+                <a:effectLst/>
+                <a:latin typeface="+mn-lt"/>
+                <a:ea typeface="+mn-ea"/>
+                <a:cs typeface="+mn-cs"/>
+              </a:rPr>
+              <a:t>Datasource</a:t>
+            </a:r>
+            <a:r>
+              <a:rPr lang="en-GB" sz="1200" b="0" i="0" kern="1200" baseline="0" dirty="0" smtClean="0">
+                <a:solidFill>
+                  <a:schemeClr val="tx1"/>
+                </a:solidFill>
+                <a:effectLst/>
+                <a:latin typeface="+mn-lt"/>
+                <a:ea typeface="+mn-ea"/>
+                <a:cs typeface="+mn-cs"/>
+              </a:rPr>
+              <a:t>, and chose which kind of chart do you want and the query to obtain the data from the </a:t>
+            </a:r>
+            <a:r>
+              <a:rPr lang="en-GB" sz="1200" b="0" i="0" kern="1200" baseline="0" dirty="0" err="1" smtClean="0">
+                <a:solidFill>
+                  <a:schemeClr val="tx1"/>
+                </a:solidFill>
+                <a:effectLst/>
+                <a:latin typeface="+mn-lt"/>
+                <a:ea typeface="+mn-ea"/>
+                <a:cs typeface="+mn-cs"/>
+              </a:rPr>
+              <a:t>datasource</a:t>
+            </a:r>
+            <a:r>
+              <a:rPr lang="en-GB" sz="1200" b="0" i="0" kern="1200" baseline="0" dirty="0" smtClean="0">
+                <a:solidFill>
+                  <a:schemeClr val="tx1"/>
+                </a:solidFill>
+                <a:effectLst/>
+                <a:latin typeface="+mn-lt"/>
+                <a:ea typeface="+mn-ea"/>
+                <a:cs typeface="+mn-cs"/>
+              </a:rPr>
+              <a:t>. But we will see a bit more in a few minutes.</a:t>
+            </a:r>
+            <a:endParaRPr lang="en-GB" baseline="0" dirty="0" smtClean="0"/>
           </a:p>
         </p:txBody>
       </p:sp>
@@ -1360,7 +1497,7 @@
     </p:spTree>
     <p:extLst>
       <p:ext uri="{BB962C8B-B14F-4D97-AF65-F5344CB8AC3E}">
-        <p14:creationId xmlns:p14="http://schemas.microsoft.com/office/powerpoint/2010/main" val="1460200977"/>
+        <p14:creationId xmlns:p14="http://schemas.microsoft.com/office/powerpoint/2010/main" val="1369295038"/>
       </p:ext>
     </p:extLst>
   </p:cSld>
@@ -1419,7 +1556,7 @@
               <a:buNone/>
             </a:pPr>
             <a:r>
-              <a:rPr lang="en-US" sz="1200" b="0" i="0" kern="1200" dirty="0" err="1" smtClean="0">
+              <a:rPr lang="en-GB" sz="1200" b="0" i="0" kern="1200" baseline="0" dirty="0" smtClean="0">
                 <a:solidFill>
                   <a:schemeClr val="tx1"/>
                 </a:solidFill>
@@ -1428,93 +1565,53 @@
                 <a:ea typeface="+mn-ea"/>
                 <a:cs typeface="+mn-cs"/>
               </a:rPr>
-              <a:t>Grafana</a:t>
-            </a:r>
-            <a:r>
-              <a:rPr lang="en-US" sz="1200" b="0" i="0" kern="1200" dirty="0" smtClean="0">
-                <a:solidFill>
-                  <a:schemeClr val="tx1"/>
-                </a:solidFill>
-                <a:effectLst/>
-                <a:latin typeface="+mn-lt"/>
-                <a:ea typeface="+mn-ea"/>
-                <a:cs typeface="+mn-cs"/>
-              </a:rPr>
-              <a:t> is an open source, feature rich metrics dashboard and graph editor for Graphite, </a:t>
-            </a:r>
-            <a:r>
-              <a:rPr lang="en-US" sz="1200" b="0" i="0" kern="1200" dirty="0" err="1" smtClean="0">
-                <a:solidFill>
-                  <a:schemeClr val="tx1"/>
-                </a:solidFill>
-                <a:effectLst/>
-                <a:latin typeface="+mn-lt"/>
-                <a:ea typeface="+mn-ea"/>
-                <a:cs typeface="+mn-cs"/>
-              </a:rPr>
-              <a:t>Elasticsearch</a:t>
-            </a:r>
-            <a:r>
-              <a:rPr lang="en-US" sz="1200" b="0" i="0" kern="1200" dirty="0" smtClean="0">
-                <a:solidFill>
-                  <a:schemeClr val="tx1"/>
-                </a:solidFill>
-                <a:effectLst/>
-                <a:latin typeface="+mn-lt"/>
-                <a:ea typeface="+mn-ea"/>
-                <a:cs typeface="+mn-cs"/>
-              </a:rPr>
-              <a:t>, </a:t>
-            </a:r>
-            <a:r>
-              <a:rPr lang="en-US" sz="1200" b="0" i="0" kern="1200" dirty="0" err="1" smtClean="0">
-                <a:solidFill>
-                  <a:schemeClr val="tx1"/>
-                </a:solidFill>
-                <a:effectLst/>
-                <a:latin typeface="+mn-lt"/>
-                <a:ea typeface="+mn-ea"/>
-                <a:cs typeface="+mn-cs"/>
-              </a:rPr>
-              <a:t>OpenTSDB</a:t>
-            </a:r>
-            <a:r>
-              <a:rPr lang="en-US" sz="1200" b="0" i="0" kern="1200" dirty="0" smtClean="0">
-                <a:solidFill>
-                  <a:schemeClr val="tx1"/>
-                </a:solidFill>
-                <a:effectLst/>
-                <a:latin typeface="+mn-lt"/>
-                <a:ea typeface="+mn-ea"/>
-                <a:cs typeface="+mn-cs"/>
-              </a:rPr>
-              <a:t>, Prometheus and </a:t>
-            </a:r>
-            <a:r>
-              <a:rPr lang="en-US" sz="1200" b="0" i="0" kern="1200" dirty="0" err="1" smtClean="0">
-                <a:solidFill>
-                  <a:schemeClr val="tx1"/>
-                </a:solidFill>
-                <a:effectLst/>
-                <a:latin typeface="+mn-lt"/>
-                <a:ea typeface="+mn-ea"/>
-                <a:cs typeface="+mn-cs"/>
-              </a:rPr>
-              <a:t>InfluxDB</a:t>
-            </a:r>
-            <a:r>
-              <a:rPr lang="en-US" sz="1200" b="0" i="0" kern="1200" dirty="0" smtClean="0">
-                <a:solidFill>
-                  <a:schemeClr val="tx1"/>
-                </a:solidFill>
-                <a:effectLst/>
-                <a:latin typeface="+mn-lt"/>
-                <a:ea typeface="+mn-ea"/>
-                <a:cs typeface="+mn-cs"/>
-              </a:rPr>
-              <a:t>.</a:t>
-            </a:r>
-            <a:endParaRPr lang="en-GB" baseline="0" dirty="0" smtClean="0"/>
+              <a:t>Now that the introductions have made and they are almost members of our family. Let’s see how we can install and configure every component. For that we are going use Docker. As we know we could first pull the image and the run the container or we can do both things at the same time. So in order to install Prometheus we should execute the following command: </a:t>
+            </a:r>
+            <a:r>
+              <a:rPr lang="en-US" i="1" dirty="0" err="1" smtClean="0"/>
+              <a:t>docker</a:t>
+            </a:r>
+            <a:r>
+              <a:rPr lang="en-US" i="1" dirty="0" smtClean="0"/>
+              <a:t> run --name </a:t>
+            </a:r>
+            <a:r>
+              <a:rPr lang="en-US" i="1" dirty="0" err="1" smtClean="0"/>
+              <a:t>prometheus</a:t>
+            </a:r>
+            <a:r>
+              <a:rPr lang="en-US" i="1" dirty="0" smtClean="0"/>
+              <a:t> -d -p 127.0.0.1:9090:9090 prom/Prometheus </a:t>
+            </a:r>
+            <a:r>
+              <a:rPr lang="en-US" i="0" dirty="0" smtClean="0"/>
+              <a:t>and</a:t>
+            </a:r>
+            <a:r>
+              <a:rPr lang="en-US" i="0" baseline="0" dirty="0" smtClean="0"/>
+              <a:t> we do the same </a:t>
+            </a:r>
+            <a:r>
+              <a:rPr lang="en-US" i="0" baseline="0" dirty="0" err="1" smtClean="0"/>
+              <a:t>iin</a:t>
+            </a:r>
+            <a:r>
+              <a:rPr lang="en-US" i="0" baseline="0" dirty="0" smtClean="0"/>
+              <a:t> order to install </a:t>
+            </a:r>
+            <a:r>
+              <a:rPr lang="en-US" i="0" baseline="0" dirty="0" err="1" smtClean="0"/>
+              <a:t>grafana</a:t>
+            </a:r>
+            <a:r>
+              <a:rPr lang="en-US" i="0" baseline="0" dirty="0" smtClean="0"/>
+              <a:t>: </a:t>
+            </a:r>
+            <a:r>
+              <a:rPr lang="sv-SE" i="1" dirty="0" smtClean="0"/>
+              <a:t>docker run -d -p 3000:3000 grafana/grafana</a:t>
+            </a:r>
+            <a:endParaRPr lang="en-GB" i="1" baseline="0" dirty="0" smtClean="0"/>
           </a:p>
         </p:txBody>
       </p:sp>
@@ -1544,7 +1641,7 @@
     </p:spTree>
     <p:extLst>
       <p:ext uri="{BB962C8B-B14F-4D97-AF65-F5344CB8AC3E}">
-        <p14:creationId xmlns:p14="http://schemas.microsoft.com/office/powerpoint/2010/main" val="2007484448"/>
+        <p14:creationId xmlns:p14="http://schemas.microsoft.com/office/powerpoint/2010/main" val="1023286552"/>
       </p:ext>
     </p:extLst>
   </p:cSld>
@@ -1603,114 +1700,40 @@
               <a:buNone/>
             </a:pPr>
             <a:r>
-              <a:rPr lang="en-GB" sz="1200" b="0" i="0" kern="1200" baseline="0" dirty="0" smtClean="0">
-                <a:solidFill>
-                  <a:schemeClr val="tx1"/>
-                </a:solidFill>
-                <a:effectLst/>
-                <a:latin typeface="+mn-lt"/>
-                <a:ea typeface="+mn-ea"/>
-                <a:cs typeface="+mn-cs"/>
-              </a:rPr>
-              <a:t>One of the key points of adopting </a:t>
-            </a:r>
-            <a:r>
-              <a:rPr lang="en-GB" sz="1200" b="0" i="0" kern="1200" baseline="0" dirty="0" err="1" smtClean="0">
-                <a:solidFill>
-                  <a:schemeClr val="tx1"/>
-                </a:solidFill>
-                <a:effectLst/>
-                <a:latin typeface="+mn-lt"/>
-                <a:ea typeface="+mn-ea"/>
-                <a:cs typeface="+mn-cs"/>
-              </a:rPr>
-              <a:t>Grafana</a:t>
-            </a:r>
-            <a:r>
-              <a:rPr lang="en-GB" sz="1200" b="0" i="0" kern="1200" baseline="0" dirty="0" smtClean="0">
-                <a:solidFill>
-                  <a:schemeClr val="tx1"/>
-                </a:solidFill>
-                <a:effectLst/>
-                <a:latin typeface="+mn-lt"/>
-                <a:ea typeface="+mn-ea"/>
-                <a:cs typeface="+mn-cs"/>
-              </a:rPr>
-              <a:t> is how easy is to build a spot on dashboard. Basically you add one or several panels, each of one configured with one </a:t>
-            </a:r>
-            <a:r>
-              <a:rPr lang="en-GB" sz="1200" b="0" i="0" kern="1200" baseline="0" dirty="0" err="1" smtClean="0">
-                <a:solidFill>
-                  <a:schemeClr val="tx1"/>
-                </a:solidFill>
-                <a:effectLst/>
-                <a:latin typeface="+mn-lt"/>
-                <a:ea typeface="+mn-ea"/>
-                <a:cs typeface="+mn-cs"/>
-              </a:rPr>
-              <a:t>datasource</a:t>
-            </a:r>
-            <a:r>
-              <a:rPr lang="en-GB" sz="1200" b="0" i="0" kern="1200" baseline="0" dirty="0" smtClean="0">
-                <a:solidFill>
-                  <a:schemeClr val="tx1"/>
-                </a:solidFill>
-                <a:effectLst/>
-                <a:latin typeface="+mn-lt"/>
-                <a:ea typeface="+mn-ea"/>
-                <a:cs typeface="+mn-cs"/>
-              </a:rPr>
-              <a:t>, in our case always Prometheus as </a:t>
-            </a:r>
-            <a:r>
-              <a:rPr lang="en-GB" sz="1200" b="0" i="0" kern="1200" baseline="0" dirty="0" err="1" smtClean="0">
-                <a:solidFill>
-                  <a:schemeClr val="tx1"/>
-                </a:solidFill>
-                <a:effectLst/>
-                <a:latin typeface="+mn-lt"/>
-                <a:ea typeface="+mn-ea"/>
-                <a:cs typeface="+mn-cs"/>
-              </a:rPr>
-              <a:t>Datasource</a:t>
-            </a:r>
-            <a:r>
-              <a:rPr lang="en-GB" sz="1200" b="0" i="0" kern="1200" baseline="0" dirty="0" smtClean="0">
-                <a:solidFill>
-                  <a:schemeClr val="tx1"/>
-                </a:solidFill>
-                <a:effectLst/>
-                <a:latin typeface="+mn-lt"/>
-                <a:ea typeface="+mn-ea"/>
-                <a:cs typeface="+mn-cs"/>
-              </a:rPr>
-              <a:t>, and chose which kind of chart do you want and the query to obtain the data from the </a:t>
-            </a:r>
-            <a:r>
-              <a:rPr lang="en-GB" sz="1200" b="0" i="0" kern="1200" baseline="0" dirty="0" err="1" smtClean="0">
-                <a:solidFill>
-                  <a:schemeClr val="tx1"/>
-                </a:solidFill>
-                <a:effectLst/>
-                <a:latin typeface="+mn-lt"/>
-                <a:ea typeface="+mn-ea"/>
-                <a:cs typeface="+mn-cs"/>
-              </a:rPr>
-              <a:t>datasource</a:t>
-            </a:r>
-            <a:r>
-              <a:rPr lang="en-GB" sz="1200" b="0" i="0" kern="1200" baseline="0" dirty="0" smtClean="0">
-                <a:solidFill>
-                  <a:schemeClr val="tx1"/>
-                </a:solidFill>
-                <a:effectLst/>
-                <a:latin typeface="+mn-lt"/>
-                <a:ea typeface="+mn-ea"/>
-                <a:cs typeface="+mn-cs"/>
-              </a:rPr>
-              <a:t>. But we will see a bit more in a few minutes.</a:t>
-            </a:r>
-            <a:endParaRPr lang="en-GB" baseline="0" dirty="0" smtClean="0"/>
+              <a:rPr lang="en-GB" i="0" baseline="0" dirty="0" smtClean="0"/>
+              <a:t>We can configure Prometheus using a </a:t>
+            </a:r>
+            <a:r>
+              <a:rPr lang="en-GB" i="0" baseline="0" dirty="0" err="1" smtClean="0"/>
+              <a:t>yml</a:t>
+            </a:r>
+            <a:r>
+              <a:rPr lang="en-GB" i="0" baseline="0" dirty="0" smtClean="0"/>
+              <a:t> file. In this </a:t>
+            </a:r>
+            <a:r>
+              <a:rPr lang="en-GB" i="0" baseline="0" dirty="0" err="1" smtClean="0"/>
+              <a:t>yml</a:t>
+            </a:r>
+            <a:r>
+              <a:rPr lang="en-GB" i="0" baseline="0" dirty="0" smtClean="0"/>
+              <a:t> file we can specify things like how often we want to scrape information and the jobs or exporters for these metrics. Every exporter is define as a job, with a name and basically the endpoint to obtain the data. In our example we can see that we have define 3 jobs / exporters: Prometheus itself, </a:t>
+            </a:r>
+            <a:r>
+              <a:rPr lang="en-GB" i="0" baseline="0" dirty="0" err="1" smtClean="0"/>
+              <a:t>cadvisor</a:t>
+            </a:r>
+            <a:r>
+              <a:rPr lang="en-GB" i="0" baseline="0" dirty="0" smtClean="0"/>
+              <a:t>, that can give us information about the containers and node-exporter, that can give us information about the container’s host.</a:t>
+            </a:r>
+          </a:p>
+          <a:p>
+            <a:pPr marL="0" indent="0">
+              <a:buFontTx/>
+              <a:buNone/>
+            </a:pPr>
+            <a:endParaRPr lang="en-GB" i="0" baseline="0" dirty="0" smtClean="0"/>
           </a:p>
         </p:txBody>
       </p:sp>
@@ -1731,7 +1754,7 @@
           <a:p>
             <a:fld id="{B556AE0B-9A09-4686-9430-C1DED322D347}" type="slidenum">
               <a:rPr lang="en-US" smtClean="0"/>
-              <a:t>18</a:t>
+              <a:t>19</a:t>
             </a:fld>
             <a:endParaRPr lang="en-US"/>
           </a:p>
@@ -1740,7 +1763,7 @@
     </p:spTree>
     <p:extLst>
       <p:ext uri="{BB962C8B-B14F-4D97-AF65-F5344CB8AC3E}">
-        <p14:creationId xmlns:p14="http://schemas.microsoft.com/office/powerpoint/2010/main" val="1369295038"/>
+        <p14:creationId xmlns:p14="http://schemas.microsoft.com/office/powerpoint/2010/main" val="529984584"/>
       </p:ext>
     </p:extLst>
   </p:cSld>
@@ -1799,62 +1822,16 @@
               <a:buNone/>
             </a:pPr>
             <a:r>
-              <a:rPr lang="en-GB" sz="1200" b="0" i="0" kern="1200" baseline="0" dirty="0" smtClean="0">
-                <a:solidFill>
-                  <a:schemeClr val="tx1"/>
-                </a:solidFill>
-                <a:effectLst/>
-                <a:latin typeface="+mn-lt"/>
-                <a:ea typeface="+mn-ea"/>
-                <a:cs typeface="+mn-cs"/>
-              </a:rPr>
-              <a:t>Now that the introductions have made and they are almost members of our family. Let’s see how we can install and configure every component. For that we are going use Docker. As we know we could first pull the image and the run the container or we can do both things at the same time. So in order to install Prometheus we should execute the following command: </a:t>
-            </a:r>
-            <a:r>
-              <a:rPr lang="en-US" i="1" dirty="0" err="1" smtClean="0"/>
-              <a:t>docker</a:t>
-            </a:r>
-            <a:r>
-              <a:rPr lang="en-US" i="1" dirty="0" smtClean="0"/>
-              <a:t> run --name </a:t>
-            </a:r>
-            <a:r>
-              <a:rPr lang="en-US" i="1" dirty="0" err="1" smtClean="0"/>
-              <a:t>prometheus</a:t>
-            </a:r>
-            <a:r>
-              <a:rPr lang="en-US" i="1" dirty="0" smtClean="0"/>
-              <a:t> -d -p 127.0.0.1:9090:9090 prom/Prometheus </a:t>
-            </a:r>
-            <a:r>
-              <a:rPr lang="en-US" i="0" dirty="0" smtClean="0"/>
-              <a:t>and</a:t>
-            </a:r>
-            <a:r>
-              <a:rPr lang="en-US" i="0" baseline="0" dirty="0" smtClean="0"/>
-              <a:t> we do the same </a:t>
-            </a:r>
-            <a:r>
-              <a:rPr lang="en-US" i="0" baseline="0" dirty="0" err="1" smtClean="0"/>
-              <a:t>iin</a:t>
-            </a:r>
-            <a:r>
-              <a:rPr lang="en-US" i="0" baseline="0" dirty="0" smtClean="0"/>
-              <a:t> order to install </a:t>
-            </a:r>
-            <a:r>
-              <a:rPr lang="en-US" i="0" baseline="0" dirty="0" err="1" smtClean="0"/>
-              <a:t>grafana</a:t>
-            </a:r>
-            <a:r>
-              <a:rPr lang="en-US" i="0" baseline="0" dirty="0" smtClean="0"/>
-              <a:t>: </a:t>
-            </a:r>
-            <a:r>
-              <a:rPr lang="sv-SE" i="1" dirty="0" smtClean="0"/>
-              <a:t>docker run -d -p 3000:3000 grafana/grafana</a:t>
-            </a:r>
-            <a:endParaRPr lang="en-GB" i="1" baseline="0" dirty="0" smtClean="0"/>
+              <a:rPr lang="en-GB" i="0" baseline="0" dirty="0" smtClean="0"/>
+              <a:t>Ok, we know that we have a system that can collect metrics. The next clever question to ask ourselves is what should I monitor? The short answers is you should monitor everything. Every library, subsystem and service should have at least a few metrics to give us some rough idea of what is going on. Now you can think OMG that could be a full time job if I have to write exporters for everything that we are using. Fortunately, there is a huge community and software vendors that are building exporters to be used or to be integrated with Prometheus. So you should only focus on building the metrics for your own software. Let’s see a list of this exporters, shall we?</a:t>
+            </a:r>
+          </a:p>
+          <a:p>
+            <a:pPr marL="0" indent="0">
+              <a:buFontTx/>
+              <a:buNone/>
+            </a:pPr>
+            <a:endParaRPr lang="en-GB" i="0" baseline="0" dirty="0" smtClean="0"/>
           </a:p>
         </p:txBody>
       </p:sp>
@@ -1875,7 +1852,7 @@
           <a:p>
             <a:fld id="{B556AE0B-9A09-4686-9430-C1DED322D347}" type="slidenum">
               <a:rPr lang="en-US" smtClean="0"/>
-              <a:t>19</a:t>
+              <a:t>20</a:t>
             </a:fld>
             <a:endParaRPr lang="en-US"/>
           </a:p>
@@ -1884,7 +1861,7 @@
     </p:spTree>
     <p:extLst>
       <p:ext uri="{BB962C8B-B14F-4D97-AF65-F5344CB8AC3E}">
-        <p14:creationId xmlns:p14="http://schemas.microsoft.com/office/powerpoint/2010/main" val="1023286552"/>
+        <p14:creationId xmlns:p14="http://schemas.microsoft.com/office/powerpoint/2010/main" val="354882519"/>
       </p:ext>
     </p:extLst>
   </p:cSld>
@@ -2054,23 +2031,50 @@
           <a:bodyPr/>
           <a:lstStyle/>
           <a:p>
-            <a:r>
-              <a:rPr lang="en-GB" dirty="0" smtClean="0"/>
-              <a:t>This is Madame</a:t>
-            </a:r>
-            <a:r>
-              <a:rPr lang="en-GB" baseline="0" dirty="0" smtClean="0"/>
-              <a:t> Gazelle. </a:t>
-            </a:r>
-            <a:r>
-              <a:rPr lang="en-GB" baseline="0" dirty="0" err="1" smtClean="0"/>
-              <a:t>Peppa’s</a:t>
-            </a:r>
-            <a:r>
-              <a:rPr lang="en-GB" baseline="0" dirty="0" smtClean="0"/>
-              <a:t> teacher. Let’s see know how to configure Prometheus to collect information from the exporters.</a:t>
-            </a:r>
-            <a:endParaRPr lang="en-US" dirty="0"/>
+            <a:pPr marL="0" indent="0">
+              <a:buFontTx/>
+              <a:buNone/>
+            </a:pPr>
+            <a:r>
+              <a:rPr lang="en-GB" i="0" baseline="0" dirty="0" smtClean="0"/>
+              <a:t>The Prometheus community is quite big and there are lots of third parties libraries that can help us exporting metrics. Some of them our maintain by the official Prometheus organization and some others by different organizations, user communities or individuals.  </a:t>
+            </a:r>
+            <a:endParaRPr lang="en-GB" i="0" baseline="0" dirty="0" smtClean="0"/>
+          </a:p>
+          <a:p>
+            <a:pPr marL="0" indent="0">
+              <a:buFontTx/>
+              <a:buNone/>
+            </a:pPr>
+            <a:r>
+              <a:rPr lang="en-GB" i="0" baseline="0" dirty="0" smtClean="0"/>
+              <a:t>We can find exporters for databases, hardware, messaging systems, storage, http, APIs, logging and so on. </a:t>
+            </a:r>
+          </a:p>
+          <a:p>
+            <a:pPr marL="0" indent="0">
+              <a:buFontTx/>
+              <a:buNone/>
+            </a:pPr>
+            <a:r>
+              <a:rPr lang="en-GB" i="0" baseline="0" dirty="0" smtClean="0"/>
+              <a:t>In addition, there are a lot of official and unofficial client libraries that allows us to create metrics for our applications. These libraries are available for the most common languages like: Go, Java, Python, Ruby, C++, .NET/C#, Node.js, PHP, Haskell, PHP, etc.</a:t>
+            </a:r>
+          </a:p>
+          <a:p>
+            <a:pPr marL="0" indent="0">
+              <a:buFontTx/>
+              <a:buNone/>
+            </a:pPr>
+            <a:r>
+              <a:rPr lang="en-GB" i="0" baseline="0" dirty="0" smtClean="0"/>
+              <a:t>Let’s see how we can add instrumentation to our </a:t>
+            </a:r>
+            <a:r>
+              <a:rPr lang="en-GB" i="0" baseline="0" smtClean="0"/>
+              <a:t>application.</a:t>
+            </a:r>
+            <a:endParaRPr lang="en-GB" i="0" baseline="0" dirty="0" smtClean="0"/>
           </a:p>
         </p:txBody>
       </p:sp>
@@ -2100,7 +2104,7 @@
     </p:spTree>
     <p:extLst>
       <p:ext uri="{BB962C8B-B14F-4D97-AF65-F5344CB8AC3E}">
-        <p14:creationId xmlns:p14="http://schemas.microsoft.com/office/powerpoint/2010/main" val="1119930066"/>
+        <p14:creationId xmlns:p14="http://schemas.microsoft.com/office/powerpoint/2010/main" val="2080343191"/>
       </p:ext>
     </p:extLst>
   </p:cSld>
@@ -2154,45 +2158,7 @@
           <a:bodyPr/>
           <a:lstStyle/>
           <a:p>
-            <a:pPr marL="0" indent="0">
-              <a:buFontTx/>
-              <a:buNone/>
-            </a:pPr>
-            <a:r>
-              <a:rPr lang="en-GB" i="0" baseline="0" dirty="0" smtClean="0"/>
-              <a:t>We can configure Prometheus using a </a:t>
-            </a:r>
-            <a:r>
-              <a:rPr lang="en-GB" i="0" baseline="0" dirty="0" err="1" smtClean="0"/>
-              <a:t>yml</a:t>
-            </a:r>
-            <a:r>
-              <a:rPr lang="en-GB" i="0" baseline="0" dirty="0" smtClean="0"/>
-              <a:t> file. In this </a:t>
-            </a:r>
-            <a:r>
-              <a:rPr lang="en-GB" i="0" baseline="0" dirty="0" err="1" smtClean="0"/>
-              <a:t>yml</a:t>
-            </a:r>
-            <a:r>
-              <a:rPr lang="en-GB" i="0" baseline="0" dirty="0" smtClean="0"/>
-              <a:t> file we can specify things like how often we want to scrape information and the jobs or exporters for these metrics. Every exporter is define as a job, with a name and basically the endpoint to obtain the data. In our example we can see that we have define 3 jobs / exporters: Prometheus itself, </a:t>
-            </a:r>
-            <a:r>
-              <a:rPr lang="en-GB" i="0" baseline="0" dirty="0" err="1" smtClean="0"/>
-              <a:t>cadvisor</a:t>
-            </a:r>
-            <a:r>
-              <a:rPr lang="en-GB" i="0" baseline="0" dirty="0" smtClean="0"/>
-              <a:t>, that can give us information about the containers and node-exporter, that can give us information about the container’s host.</a:t>
-            </a:r>
-          </a:p>
-          <a:p>
-            <a:pPr marL="0" indent="0">
-              <a:buFontTx/>
-              <a:buNone/>
-            </a:pPr>
-            <a:endParaRPr lang="en-GB" i="0" baseline="0" dirty="0" smtClean="0"/>
+            <a:endParaRPr lang="en-US" dirty="0"/>
           </a:p>
         </p:txBody>
       </p:sp>
@@ -2213,7 +2179,7 @@
           <a:p>
             <a:fld id="{B556AE0B-9A09-4686-9430-C1DED322D347}" type="slidenum">
               <a:rPr lang="en-US" smtClean="0"/>
-              <a:t>22</a:t>
+              <a:t>27</a:t>
             </a:fld>
             <a:endParaRPr lang="en-US"/>
           </a:p>
@@ -2222,7 +2188,7 @@
     </p:spTree>
     <p:extLst>
       <p:ext uri="{BB962C8B-B14F-4D97-AF65-F5344CB8AC3E}">
-        <p14:creationId xmlns:p14="http://schemas.microsoft.com/office/powerpoint/2010/main" val="529984584"/>
+        <p14:creationId xmlns:p14="http://schemas.microsoft.com/office/powerpoint/2010/main" val="1790340667"/>
       </p:ext>
     </p:extLst>
   </p:cSld>
@@ -2276,21 +2242,7 @@
           <a:bodyPr/>
           <a:lstStyle/>
           <a:p>
-            <a:pPr marL="0" indent="0">
-              <a:buFontTx/>
-              <a:buNone/>
-            </a:pPr>
-            <a:r>
-              <a:rPr lang="en-GB" i="0" baseline="0" dirty="0" smtClean="0"/>
-              <a:t>Ok, we know that we have a system that can collect metrics. The next clever question to ask ourselves is what should I monitor? The short answers is you should monitor everything. Every library, subsystem and service should have at least a few metrics to give us some rough idea of what is going on. Now you can think OMG that could be a full time job if I have to write exporters for everything that we are using. Fortunately, there is a huge community and software vendors that are building exporters to be used or to be integrated with Prometheus. So you should only focus on building the metrics for your own software. Let’s see a list of this exporters, shall we?</a:t>
-            </a:r>
-          </a:p>
-          <a:p>
-            <a:pPr marL="0" indent="0">
-              <a:buFontTx/>
-              <a:buNone/>
-            </a:pPr>
-            <a:endParaRPr lang="en-GB" i="0" baseline="0" dirty="0" smtClean="0"/>
+            <a:endParaRPr lang="en-US" dirty="0"/>
           </a:p>
         </p:txBody>
       </p:sp>
@@ -2311,7 +2263,7 @@
           <a:p>
             <a:fld id="{B556AE0B-9A09-4686-9430-C1DED322D347}" type="slidenum">
               <a:rPr lang="en-US" smtClean="0"/>
-              <a:t>23</a:t>
+              <a:t>29</a:t>
             </a:fld>
             <a:endParaRPr lang="en-US"/>
           </a:p>
@@ -2320,7 +2272,7 @@
     </p:spTree>
     <p:extLst>
       <p:ext uri="{BB962C8B-B14F-4D97-AF65-F5344CB8AC3E}">
-        <p14:creationId xmlns:p14="http://schemas.microsoft.com/office/powerpoint/2010/main" val="354882519"/>
+        <p14:creationId xmlns:p14="http://schemas.microsoft.com/office/powerpoint/2010/main" val="874462135"/>
       </p:ext>
     </p:extLst>
   </p:cSld>
@@ -2395,175 +2347,7 @@
           <a:p>
             <a:fld id="{B556AE0B-9A09-4686-9430-C1DED322D347}" type="slidenum">
               <a:rPr lang="en-US" smtClean="0"/>
-              <a:t>29</a:t>
-            </a:fld>
-            <a:endParaRPr lang="en-US"/>
-          </a:p>
-        </p:txBody>
-      </p:sp>
-    </p:spTree>
-    <p:extLst>
-      <p:ext uri="{BB962C8B-B14F-4D97-AF65-F5344CB8AC3E}">
-        <p14:creationId xmlns:p14="http://schemas.microsoft.com/office/powerpoint/2010/main" val="1790340667"/>
-      </p:ext>
-    </p:extLst>
-  </p:cSld>
-  <p:clrMapOvr>
-    <a:masterClrMapping/>
-  </p:clrMapOvr>
-</p:notes>
-</file>
-
-<file path=ppt/notesSlides/notesSlide24.xml><?xml version="1.0" encoding="utf-8"?>
-<p:notes xmlns:a="http://schemas.openxmlformats.org/drawingml/2006/main" xmlns:r="http://schemas.openxmlformats.org/officeDocument/2006/relationships" xmlns:p="http://schemas.openxmlformats.org/presentationml/2006/main">
-  <p:cSld>
-    <p:spTree>
-      <p:nvGrpSpPr>
-        <p:cNvPr id="1" name=""/>
-        <p:cNvGrpSpPr/>
-        <p:nvPr/>
-      </p:nvGrpSpPr>
-      <p:grpSpPr>
-        <a:xfrm>
-          <a:off x="0" y="0"/>
-          <a:ext cx="0" cy="0"/>
-          <a:chOff x="0" y="0"/>
-          <a:chExt cx="0" cy="0"/>
-        </a:xfrm>
-      </p:grpSpPr>
-      <p:sp>
-        <p:nvSpPr>
-          <p:cNvPr id="2" name="Slide Image Placeholder 1"/>
-          <p:cNvSpPr>
-            <a:spLocks noGrp="1" noRot="1" noChangeAspect="1"/>
-          </p:cNvSpPr>
-          <p:nvPr>
-            <p:ph type="sldImg"/>
-          </p:nvPr>
-        </p:nvSpPr>
-        <p:spPr/>
-      </p:sp>
-      <p:sp>
-        <p:nvSpPr>
-          <p:cNvPr id="3" name="Notes Placeholder 2"/>
-          <p:cNvSpPr>
-            <a:spLocks noGrp="1"/>
-          </p:cNvSpPr>
-          <p:nvPr>
-            <p:ph type="body" idx="1"/>
-          </p:nvPr>
-        </p:nvSpPr>
-        <p:spPr/>
-        <p:txBody>
-          <a:bodyPr/>
-          <a:lstStyle/>
-          <a:p>
-            <a:endParaRPr lang="en-US" dirty="0"/>
-          </a:p>
-        </p:txBody>
-      </p:sp>
-      <p:sp>
-        <p:nvSpPr>
-          <p:cNvPr id="4" name="Slide Number Placeholder 3"/>
-          <p:cNvSpPr>
-            <a:spLocks noGrp="1"/>
-          </p:cNvSpPr>
-          <p:nvPr>
-            <p:ph type="sldNum" sz="quarter" idx="10"/>
-          </p:nvPr>
-        </p:nvSpPr>
-        <p:spPr/>
-        <p:txBody>
-          <a:bodyPr/>
-          <a:lstStyle/>
-          <a:p>
-            <a:fld id="{B556AE0B-9A09-4686-9430-C1DED322D347}" type="slidenum">
-              <a:rPr lang="en-US" smtClean="0"/>
-              <a:t>31</a:t>
-            </a:fld>
-            <a:endParaRPr lang="en-US"/>
-          </a:p>
-        </p:txBody>
-      </p:sp>
-    </p:spTree>
-    <p:extLst>
-      <p:ext uri="{BB962C8B-B14F-4D97-AF65-F5344CB8AC3E}">
-        <p14:creationId xmlns:p14="http://schemas.microsoft.com/office/powerpoint/2010/main" val="874462135"/>
-      </p:ext>
-    </p:extLst>
-  </p:cSld>
-  <p:clrMapOvr>
-    <a:masterClrMapping/>
-  </p:clrMapOvr>
-</p:notes>
-</file>
-
-<file path=ppt/notesSlides/notesSlide25.xml><?xml version="1.0" encoding="utf-8"?>
-<p:notes xmlns:a="http://schemas.openxmlformats.org/drawingml/2006/main" xmlns:r="http://schemas.openxmlformats.org/officeDocument/2006/relationships" xmlns:p="http://schemas.openxmlformats.org/presentationml/2006/main">
-  <p:cSld>
-    <p:spTree>
-      <p:nvGrpSpPr>
-        <p:cNvPr id="1" name=""/>
-        <p:cNvGrpSpPr/>
-        <p:nvPr/>
-      </p:nvGrpSpPr>
-      <p:grpSpPr>
-        <a:xfrm>
-          <a:off x="0" y="0"/>
-          <a:ext cx="0" cy="0"/>
-          <a:chOff x="0" y="0"/>
-          <a:chExt cx="0" cy="0"/>
-        </a:xfrm>
-      </p:grpSpPr>
-      <p:sp>
-        <p:nvSpPr>
-          <p:cNvPr id="2" name="Slide Image Placeholder 1"/>
-          <p:cNvSpPr>
-            <a:spLocks noGrp="1" noRot="1" noChangeAspect="1"/>
-          </p:cNvSpPr>
-          <p:nvPr>
-            <p:ph type="sldImg"/>
-          </p:nvPr>
-        </p:nvSpPr>
-        <p:spPr/>
-      </p:sp>
-      <p:sp>
-        <p:nvSpPr>
-          <p:cNvPr id="3" name="Notes Placeholder 2"/>
-          <p:cNvSpPr>
-            <a:spLocks noGrp="1"/>
-          </p:cNvSpPr>
-          <p:nvPr>
-            <p:ph type="body" idx="1"/>
-          </p:nvPr>
-        </p:nvSpPr>
-        <p:spPr/>
-        <p:txBody>
-          <a:bodyPr/>
-          <a:lstStyle/>
-          <a:p>
-            <a:endParaRPr lang="en-US" dirty="0"/>
-          </a:p>
-        </p:txBody>
-      </p:sp>
-      <p:sp>
-        <p:nvSpPr>
-          <p:cNvPr id="4" name="Slide Number Placeholder 3"/>
-          <p:cNvSpPr>
-            <a:spLocks noGrp="1"/>
-          </p:cNvSpPr>
-          <p:nvPr>
-            <p:ph type="sldNum" sz="quarter" idx="10"/>
-          </p:nvPr>
-        </p:nvSpPr>
-        <p:spPr/>
-        <p:txBody>
-          <a:bodyPr/>
-          <a:lstStyle/>
-          <a:p>
-            <a:fld id="{B556AE0B-9A09-4686-9430-C1DED322D347}" type="slidenum">
-              <a:rPr lang="en-US" smtClean="0"/>
-              <a:t>36</a:t>
+              <a:t>33</a:t>
             </a:fld>
             <a:endParaRPr lang="en-US"/>
           </a:p>
@@ -3150,137 +2934,31 @@
           <a:bodyPr/>
           <a:lstStyle/>
           <a:p>
-            <a:pPr marL="0" indent="0">
-              <a:buFontTx/>
-              <a:buNone/>
-            </a:pPr>
+            <a:r>
+              <a:rPr lang="en-GB" dirty="0" smtClean="0"/>
+              <a:t>So,</a:t>
+            </a:r>
             <a:r>
               <a:rPr lang="en-GB" baseline="0" dirty="0" smtClean="0"/>
-              <a:t>OK, this is an interesting slide. As I mentioned before I work remotely and sometimes I work from home. But my house is not so big (you know London prices…) so my 3 years old daughter is always around and she loves to interrupt me. So one day I was preparing this PowerPoint and she came and asked me:</a:t>
-            </a:r>
-          </a:p>
-          <a:p>
-            <a:pPr marL="171450" indent="-171450">
-              <a:buFontTx/>
-              <a:buChar char="-"/>
-            </a:pPr>
+              <a:t> we worked really hard and in a few months we had our business experts defining functionality using amazing wireframes, our developers had built a nice Continuous Integration system on top of </a:t>
+            </a:r>
             <a:r>
               <a:rPr lang="en-GB" baseline="0" dirty="0" err="1" smtClean="0"/>
-              <a:t>Papi</a:t>
+              <a:t>Gitlab</a:t>
             </a:r>
             <a:r>
               <a:rPr lang="en-GB" baseline="0" dirty="0" smtClean="0"/>
-              <a:t> what are you doing?</a:t>
-            </a:r>
-          </a:p>
-          <a:p>
-            <a:pPr marL="171450" indent="-171450">
-              <a:buFontTx/>
-              <a:buChar char="-"/>
-            </a:pPr>
+              <a:t>, with a nice pipeline that build our solution, execute some tests, and deployed everything inside of Docker containers. So testers, domain experts, and stakeholders could navigate to our application built with angular and </a:t>
+            </a:r>
+            <a:r>
+              <a:rPr lang="en-GB" baseline="0" dirty="0" err="1" smtClean="0"/>
+              <a:t>dotnet</a:t>
+            </a:r>
             <a:r>
               <a:rPr lang="en-GB" baseline="0" dirty="0" smtClean="0"/>
-              <a:t>I have to put some images to talk in front of people and tell them what I am working on</a:t>
-            </a:r>
-          </a:p>
-          <a:p>
-            <a:pPr marL="171450" indent="-171450">
-              <a:buFontTx/>
-              <a:buChar char="-"/>
-            </a:pPr>
-            <a:r>
-              <a:rPr lang="en-GB" baseline="0" dirty="0" smtClean="0"/>
-              <a:t>Why don’t you explain </a:t>
-            </a:r>
-            <a:r>
-              <a:rPr lang="en-GB" baseline="0" dirty="0" err="1" smtClean="0"/>
-              <a:t>Peppa</a:t>
-            </a:r>
-            <a:r>
-              <a:rPr lang="en-GB" baseline="0" dirty="0" smtClean="0"/>
-              <a:t> Pig?</a:t>
-            </a:r>
-          </a:p>
-          <a:p>
-            <a:pPr marL="171450" indent="-171450">
-              <a:buFontTx/>
-              <a:buChar char="-"/>
-            </a:pPr>
-            <a:r>
-              <a:rPr lang="en-GB" baseline="0" dirty="0" smtClean="0"/>
-              <a:t>I cannot do that.</a:t>
-            </a:r>
-          </a:p>
-          <a:p>
-            <a:pPr marL="171450" indent="-171450">
-              <a:buFontTx/>
-              <a:buChar char="-"/>
-            </a:pPr>
-            <a:r>
-              <a:rPr lang="en-GB" baseline="0" dirty="0" smtClean="0"/>
-              <a:t>Please, </a:t>
-            </a:r>
-            <a:r>
-              <a:rPr lang="en-GB" baseline="0" dirty="0" err="1" smtClean="0"/>
-              <a:t>Papi</a:t>
-            </a:r>
-            <a:r>
-              <a:rPr lang="en-GB" baseline="0" dirty="0" smtClean="0"/>
-              <a:t>, everyone loves </a:t>
-            </a:r>
-            <a:r>
-              <a:rPr lang="en-GB" baseline="0" dirty="0" err="1" smtClean="0"/>
-              <a:t>Peppa</a:t>
-            </a:r>
-            <a:r>
-              <a:rPr lang="en-GB" baseline="0" dirty="0" smtClean="0"/>
-              <a:t> Pig</a:t>
-            </a:r>
-          </a:p>
-          <a:p>
-            <a:pPr marL="171450" indent="-171450">
-              <a:buFontTx/>
-              <a:buChar char="-"/>
-            </a:pPr>
-            <a:r>
-              <a:rPr lang="en-GB" baseline="0" dirty="0" smtClean="0"/>
-              <a:t>OK, I will do that if you let me work for two hours.</a:t>
-            </a:r>
-          </a:p>
-          <a:p>
-            <a:pPr marL="171450" indent="-171450">
-              <a:buFontTx/>
-              <a:buChar char="-"/>
-            </a:pPr>
-            <a:endParaRPr lang="en-GB" baseline="0" dirty="0" smtClean="0"/>
-          </a:p>
-          <a:p>
-            <a:pPr marL="0" indent="0">
-              <a:buFontTx/>
-              <a:buNone/>
-            </a:pPr>
-            <a:r>
-              <a:rPr lang="en-GB" baseline="0" dirty="0" smtClean="0"/>
-              <a:t>And here we are. So this is Daddy Pig, Mummy Pig, </a:t>
-            </a:r>
-            <a:r>
-              <a:rPr lang="en-GB" baseline="0" dirty="0" err="1" smtClean="0"/>
-              <a:t>Peppa</a:t>
-            </a:r>
-            <a:r>
-              <a:rPr lang="en-GB" baseline="0" dirty="0" smtClean="0"/>
-              <a:t> and George. </a:t>
-            </a:r>
-          </a:p>
-          <a:p>
-            <a:pPr marL="0" indent="0">
-              <a:buFontTx/>
-              <a:buNone/>
-            </a:pPr>
-            <a:r>
-              <a:rPr lang="en-GB" baseline="0" dirty="0" smtClean="0"/>
-              <a:t>We felt a bit like them jumping up and down in muddy puddles when we started our new Greenfield project. </a:t>
-            </a:r>
+              <a:t> core and start giving us priceless feedback. They were happy days, but suddenly… </a:t>
+            </a:r>
+            <a:endParaRPr lang="en-US" dirty="0"/>
           </a:p>
         </p:txBody>
       </p:sp>
@@ -3310,7 +2988,7 @@
     </p:spTree>
     <p:extLst>
       <p:ext uri="{BB962C8B-B14F-4D97-AF65-F5344CB8AC3E}">
-        <p14:creationId xmlns:p14="http://schemas.microsoft.com/office/powerpoint/2010/main" val="2917200091"/>
+        <p14:creationId xmlns:p14="http://schemas.microsoft.com/office/powerpoint/2010/main" val="2703424855"/>
       </p:ext>
     </p:extLst>
   </p:cSld>
@@ -3366,27 +3044,51 @@
           <a:p>
             <a:r>
               <a:rPr lang="en-GB" dirty="0" smtClean="0"/>
-              <a:t>So,</a:t>
+              <a:t>We received a phone</a:t>
             </a:r>
             <a:r>
               <a:rPr lang="en-GB" baseline="0" dirty="0" smtClean="0"/>
-              <a:t> we worked really hard and in a few months we had our business experts defining functionality using amazing wireframes, our developers had built a nice Continuous Integration system on top of </a:t>
-            </a:r>
-            <a:r>
-              <a:rPr lang="en-GB" baseline="0" dirty="0" err="1" smtClean="0"/>
-              <a:t>Gitlab</a:t>
-            </a:r>
+              <a:t> call from our Project Director, let’s call him Mr. S.</a:t>
+            </a:r>
+          </a:p>
+          <a:p>
+            <a:pPr marL="171450" indent="-171450">
+              <a:buFontTx/>
+              <a:buChar char="-"/>
+            </a:pPr>
             <a:r>
               <a:rPr lang="en-GB" baseline="0" dirty="0" smtClean="0"/>
-              <a:t>, with a nice pipeline that build our solution, execute some tests, and deployed everything inside of Docker containers. So testers, domain experts, and stakeholders could navigate to our application built with angular and </a:t>
-            </a:r>
-            <a:r>
-              <a:rPr lang="en-GB" baseline="0" dirty="0" err="1" smtClean="0"/>
-              <a:t>dotnet</a:t>
-            </a:r>
+              <a:t>Hello guys, I have done a few demos to some departments and they love the solution that we are building.</a:t>
+            </a:r>
+          </a:p>
+          <a:p>
+            <a:pPr marL="171450" indent="-171450">
+              <a:buFontTx/>
+              <a:buChar char="-"/>
+            </a:pPr>
             <a:r>
               <a:rPr lang="en-GB" baseline="0" dirty="0" smtClean="0"/>
-              <a:t> core and start giving us priceless feedback. They were happy days, but suddenly… </a:t>
+              <a:t>Yeah that’s amazing!</a:t>
+            </a:r>
+          </a:p>
+          <a:p>
+            <a:pPr marL="171450" indent="-171450">
+              <a:buFontTx/>
+              <a:buChar char="-"/>
+            </a:pPr>
+            <a:r>
+              <a:rPr lang="en-GB" baseline="0" dirty="0" smtClean="0"/>
+              <a:t>So we have to start planning the production environment and open it to people.</a:t>
+            </a:r>
+          </a:p>
+          <a:p>
+            <a:pPr marL="171450" indent="-171450">
+              <a:buFontTx/>
+              <a:buChar char="-"/>
+            </a:pPr>
+            <a:r>
+              <a:rPr lang="en-GB" baseline="0" dirty="0" smtClean="0"/>
+              <a:t>What?!!?? </a:t>
             </a:r>
             <a:endParaRPr lang="en-US" dirty="0"/>
           </a:p>
@@ -3418,7 +3120,7 @@
     </p:spTree>
     <p:extLst>
       <p:ext uri="{BB962C8B-B14F-4D97-AF65-F5344CB8AC3E}">
-        <p14:creationId xmlns:p14="http://schemas.microsoft.com/office/powerpoint/2010/main" val="2703424855"/>
+        <p14:creationId xmlns:p14="http://schemas.microsoft.com/office/powerpoint/2010/main" val="1416724521"/>
       </p:ext>
     </p:extLst>
   </p:cSld>
@@ -3559,7 +3261,7 @@
           <a:p>
             <a:fld id="{7F323E88-D507-476B-ADDA-06C8C6410395}" type="datetimeFigureOut">
               <a:rPr lang="en-US" smtClean="0"/>
-              <a:t>1/23/2019</a:t>
+              <a:t>1/24/2019</a:t>
             </a:fld>
             <a:endParaRPr lang="en-US"/>
           </a:p>
@@ -3729,7 +3431,7 @@
           <a:p>
             <a:fld id="{7F323E88-D507-476B-ADDA-06C8C6410395}" type="datetimeFigureOut">
               <a:rPr lang="en-US" smtClean="0"/>
-              <a:t>1/23/2019</a:t>
+              <a:t>1/24/2019</a:t>
             </a:fld>
             <a:endParaRPr lang="en-US"/>
           </a:p>
@@ -3909,7 +3611,7 @@
           <a:p>
             <a:fld id="{7F323E88-D507-476B-ADDA-06C8C6410395}" type="datetimeFigureOut">
               <a:rPr lang="en-US" smtClean="0"/>
-              <a:t>1/23/2019</a:t>
+              <a:t>1/24/2019</a:t>
             </a:fld>
             <a:endParaRPr lang="en-US"/>
           </a:p>
@@ -4079,7 +3781,7 @@
           <a:p>
             <a:fld id="{7F323E88-D507-476B-ADDA-06C8C6410395}" type="datetimeFigureOut">
               <a:rPr lang="en-US" smtClean="0"/>
-              <a:t>1/23/2019</a:t>
+              <a:t>1/24/2019</a:t>
             </a:fld>
             <a:endParaRPr lang="en-US"/>
           </a:p>
@@ -4332,7 +4034,7 @@
           <a:p>
             <a:fld id="{7F323E88-D507-476B-ADDA-06C8C6410395}" type="datetimeFigureOut">
               <a:rPr lang="en-US" smtClean="0"/>
-              <a:t>1/23/2019</a:t>
+              <a:t>1/24/2019</a:t>
             </a:fld>
             <a:endParaRPr lang="en-US"/>
           </a:p>
@@ -4564,7 +4266,7 @@
           <a:p>
             <a:fld id="{7F323E88-D507-476B-ADDA-06C8C6410395}" type="datetimeFigureOut">
               <a:rPr lang="en-US" smtClean="0"/>
-              <a:t>1/23/2019</a:t>
+              <a:t>1/24/2019</a:t>
             </a:fld>
             <a:endParaRPr lang="en-US"/>
           </a:p>
@@ -4931,7 +4633,7 @@
           <a:p>
             <a:fld id="{7F323E88-D507-476B-ADDA-06C8C6410395}" type="datetimeFigureOut">
               <a:rPr lang="en-US" smtClean="0"/>
-              <a:t>1/23/2019</a:t>
+              <a:t>1/24/2019</a:t>
             </a:fld>
             <a:endParaRPr lang="en-US"/>
           </a:p>
@@ -5049,7 +4751,7 @@
           <a:p>
             <a:fld id="{7F323E88-D507-476B-ADDA-06C8C6410395}" type="datetimeFigureOut">
               <a:rPr lang="en-US" smtClean="0"/>
-              <a:t>1/23/2019</a:t>
+              <a:t>1/24/2019</a:t>
             </a:fld>
             <a:endParaRPr lang="en-US"/>
           </a:p>
@@ -5144,7 +4846,7 @@
           <a:p>
             <a:fld id="{7F323E88-D507-476B-ADDA-06C8C6410395}" type="datetimeFigureOut">
               <a:rPr lang="en-US" smtClean="0"/>
-              <a:t>1/23/2019</a:t>
+              <a:t>1/24/2019</a:t>
             </a:fld>
             <a:endParaRPr lang="en-US"/>
           </a:p>
@@ -5421,7 +5123,7 @@
           <a:p>
             <a:fld id="{7F323E88-D507-476B-ADDA-06C8C6410395}" type="datetimeFigureOut">
               <a:rPr lang="en-US" smtClean="0"/>
-              <a:t>1/23/2019</a:t>
+              <a:t>1/24/2019</a:t>
             </a:fld>
             <a:endParaRPr lang="en-US"/>
           </a:p>
@@ -5674,7 +5376,7 @@
           <a:p>
             <a:fld id="{7F323E88-D507-476B-ADDA-06C8C6410395}" type="datetimeFigureOut">
               <a:rPr lang="en-US" smtClean="0"/>
-              <a:t>1/23/2019</a:t>
+              <a:t>1/24/2019</a:t>
             </a:fld>
             <a:endParaRPr lang="en-US"/>
           </a:p>
@@ -5887,7 +5589,7 @@
           <a:p>
             <a:fld id="{7F323E88-D507-476B-ADDA-06C8C6410395}" type="datetimeFigureOut">
               <a:rPr lang="en-US" smtClean="0"/>
-              <a:t>1/23/2019</a:t>
+              <a:t>1/24/2019</a:t>
             </a:fld>
             <a:endParaRPr lang="en-US"/>
           </a:p>
@@ -6581,149 +6283,6 @@
       </p:grpSpPr>
       <p:pic>
         <p:nvPicPr>
-          <p:cNvPr id="4" name="QJoTBlDfVhk">
-            <a:hlinkClick r:id="" action="ppaction://media"/>
-          </p:cNvPr>
-          <p:cNvPicPr>
-            <a:picLocks noChangeAspect="1"/>
-          </p:cNvPicPr>
-          <p:nvPr>
-            <a:videoFile r:link="rId2"/>
-            <p:extLst>
-              <p:ext uri="{DAA4B4D4-6D71-4841-9C94-3DE7FCFB9230}">
-                <p14:media xmlns:p14="http://schemas.microsoft.com/office/powerpoint/2010/main" r:embed="rId1"/>
-              </p:ext>
-            </p:extLst>
-          </p:nvPr>
-        </p:nvPicPr>
-        <p:blipFill>
-          <a:blip r:embed="rId5"/>
-          <a:stretch>
-            <a:fillRect/>
-          </a:stretch>
-        </p:blipFill>
-        <p:spPr>
-          <a:xfrm>
-            <a:off x="2068286" y="261257"/>
-            <a:ext cx="8231777" cy="6173832"/>
-          </a:xfrm>
-          <a:prstGeom prst="rect">
-            <a:avLst/>
-          </a:prstGeom>
-        </p:spPr>
-      </p:pic>
-    </p:spTree>
-    <p:extLst>
-      <p:ext uri="{BB962C8B-B14F-4D97-AF65-F5344CB8AC3E}">
-        <p14:creationId xmlns:p14="http://schemas.microsoft.com/office/powerpoint/2010/main" val="4206498647"/>
-      </p:ext>
-    </p:extLst>
-  </p:cSld>
-  <p:clrMapOvr>
-    <a:masterClrMapping/>
-  </p:clrMapOvr>
-  <p:timing>
-    <p:tnLst>
-      <p:par>
-        <p:cTn id="1" dur="indefinite" restart="never" nodeType="tmRoot">
-          <p:childTnLst>
-            <p:seq concurrent="1" nextAc="seek">
-              <p:cTn id="2" restart="whenNotActive" fill="hold" evtFilter="cancelBubble" nodeType="interactiveSeq">
-                <p:stCondLst>
-                  <p:cond evt="onClick" delay="0">
-                    <p:tgtEl>
-                      <p:spTgt spid="4"/>
-                    </p:tgtEl>
-                  </p:cond>
-                </p:stCondLst>
-                <p:endSync evt="end" delay="0">
-                  <p:rtn val="all"/>
-                </p:endSync>
-                <p:childTnLst>
-                  <p:par>
-                    <p:cTn id="3" fill="hold">
-                      <p:stCondLst>
-                        <p:cond delay="0"/>
-                      </p:stCondLst>
-                      <p:childTnLst>
-                        <p:par>
-                          <p:cTn id="4" fill="hold">
-                            <p:stCondLst>
-                              <p:cond delay="0"/>
-                            </p:stCondLst>
-                            <p:childTnLst>
-                              <p:par>
-                                <p:cTn id="5" presetID="2" presetClass="mediacall" presetSubtype="0" fill="hold" nodeType="clickEffect">
-                                  <p:stCondLst>
-                                    <p:cond delay="0"/>
-                                  </p:stCondLst>
-                                  <p:childTnLst>
-                                    <p:cmd type="call" cmd="togglePause">
-                                      <p:cBhvr>
-                                        <p:cTn id="6" dur="1" fill="hold"/>
-                                        <p:tgtEl>
-                                          <p:spTgt spid="4"/>
-                                        </p:tgtEl>
-                                      </p:cBhvr>
-                                    </p:cmd>
-                                  </p:childTnLst>
-                                </p:cTn>
-                              </p:par>
-                            </p:childTnLst>
-                          </p:cTn>
-                        </p:par>
-                      </p:childTnLst>
-                    </p:cTn>
-                  </p:par>
-                </p:childTnLst>
-              </p:cTn>
-              <p:nextCondLst>
-                <p:cond evt="onClick" delay="0">
-                  <p:tgtEl>
-                    <p:spTgt spid="4"/>
-                  </p:tgtEl>
-                </p:cond>
-              </p:nextCondLst>
-            </p:seq>
-            <p:video>
-              <p:cMediaNode vol="80000">
-                <p:cTn id="7" fill="hold" display="0">
-                  <p:stCondLst>
-                    <p:cond delay="indefinite"/>
-                  </p:stCondLst>
-                </p:cTn>
-                <p:tgtEl>
-                  <p:spTgt spid="4"/>
-                </p:tgtEl>
-              </p:cMediaNode>
-            </p:video>
-          </p:childTnLst>
-        </p:cTn>
-      </p:par>
-    </p:tnLst>
-  </p:timing>
-</p:sld>
-</file>
-
-<file path=ppt/slides/slide11.xml><?xml version="1.0" encoding="utf-8"?>
-<p:sld xmlns:a="http://schemas.openxmlformats.org/drawingml/2006/main" xmlns:r="http://schemas.openxmlformats.org/officeDocument/2006/relationships" xmlns:p="http://schemas.openxmlformats.org/presentationml/2006/main">
-  <p:cSld>
-    <p:spTree>
-      <p:nvGrpSpPr>
-        <p:cNvPr id="1" name=""/>
-        <p:cNvGrpSpPr/>
-        <p:nvPr/>
-      </p:nvGrpSpPr>
-      <p:grpSpPr>
-        <a:xfrm>
-          <a:off x="0" y="0"/>
-          <a:ext cx="0" cy="0"/>
-          <a:chOff x="0" y="0"/>
-          <a:chExt cx="0" cy="0"/>
-        </a:xfrm>
-      </p:grpSpPr>
-      <p:pic>
-        <p:nvPicPr>
           <p:cNvPr id="6148" name="Picture 4" descr="Image result for fry panic"/>
           <p:cNvPicPr>
             <a:picLocks noChangeAspect="1" noChangeArrowheads="1"/>
@@ -6776,7 +6335,7 @@
 </p:sld>
 </file>
 
-<file path=ppt/slides/slide12.xml><?xml version="1.0" encoding="utf-8"?>
+<file path=ppt/slides/slide11.xml><?xml version="1.0" encoding="utf-8"?>
 <p:sld xmlns:a="http://schemas.openxmlformats.org/drawingml/2006/main" xmlns:r="http://schemas.openxmlformats.org/officeDocument/2006/relationships" xmlns:p="http://schemas.openxmlformats.org/presentationml/2006/main">
   <p:cSld>
     <p:spTree>
@@ -6837,7 +6396,7 @@
 </p:sld>
 </file>
 
-<file path=ppt/slides/slide13.xml><?xml version="1.0" encoding="utf-8"?>
+<file path=ppt/slides/slide12.xml><?xml version="1.0" encoding="utf-8"?>
 <p:sld xmlns:a="http://schemas.openxmlformats.org/drawingml/2006/main" xmlns:r="http://schemas.openxmlformats.org/officeDocument/2006/relationships" xmlns:p="http://schemas.openxmlformats.org/presentationml/2006/main">
   <p:cSld>
     <p:spTree>
@@ -7154,85 +6713,7 @@
 </p:sld>
 </file>
 
-<file path=ppt/slides/slide14.xml><?xml version="1.0" encoding="utf-8"?>
-<p:sld xmlns:a="http://schemas.openxmlformats.org/drawingml/2006/main" xmlns:r="http://schemas.openxmlformats.org/officeDocument/2006/relationships" xmlns:p="http://schemas.openxmlformats.org/presentationml/2006/main">
-  <p:cSld>
-    <p:spTree>
-      <p:nvGrpSpPr>
-        <p:cNvPr id="1" name=""/>
-        <p:cNvGrpSpPr/>
-        <p:nvPr/>
-      </p:nvGrpSpPr>
-      <p:grpSpPr>
-        <a:xfrm>
-          <a:off x="0" y="0"/>
-          <a:ext cx="0" cy="0"/>
-          <a:chOff x="0" y="0"/>
-          <a:chExt cx="0" cy="0"/>
-        </a:xfrm>
-      </p:grpSpPr>
-      <p:pic>
-        <p:nvPicPr>
-          <p:cNvPr id="10244" name="Picture 4" descr="Related image"/>
-          <p:cNvPicPr>
-            <a:picLocks noChangeAspect="1" noChangeArrowheads="1"/>
-          </p:cNvPicPr>
-          <p:nvPr/>
-        </p:nvPicPr>
-        <p:blipFill>
-          <a:blip r:embed="rId3">
-            <a:extLst>
-              <a:ext uri="{28A0092B-C50C-407E-A947-70E740481C1C}">
-                <a14:useLocalDpi xmlns:a14="http://schemas.microsoft.com/office/drawing/2010/main" val="0"/>
-              </a:ext>
-            </a:extLst>
-          </a:blip>
-          <a:srcRect/>
-          <a:stretch>
-            <a:fillRect/>
-          </a:stretch>
-        </p:blipFill>
-        <p:spPr bwMode="auto">
-          <a:xfrm>
-            <a:off x="3081338" y="1166813"/>
-            <a:ext cx="6029325" cy="4524375"/>
-          </a:xfrm>
-          <a:prstGeom prst="rect">
-            <a:avLst/>
-          </a:prstGeom>
-          <a:noFill/>
-          <a:extLst>
-            <a:ext uri="{909E8E84-426E-40DD-AFC4-6F175D3DCCD1}">
-              <a14:hiddenFill xmlns:a14="http://schemas.microsoft.com/office/drawing/2010/main">
-                <a:solidFill>
-                  <a:srgbClr val="FFFFFF"/>
-                </a:solidFill>
-              </a14:hiddenFill>
-            </a:ext>
-          </a:extLst>
-        </p:spPr>
-      </p:pic>
-    </p:spTree>
-    <p:extLst>
-      <p:ext uri="{BB962C8B-B14F-4D97-AF65-F5344CB8AC3E}">
-        <p14:creationId xmlns:p14="http://schemas.microsoft.com/office/powerpoint/2010/main" val="498205361"/>
-      </p:ext>
-    </p:extLst>
-  </p:cSld>
-  <p:clrMapOvr>
-    <a:masterClrMapping/>
-  </p:clrMapOvr>
-  <p:timing>
-    <p:tnLst>
-      <p:par>
-        <p:cTn id="1" dur="indefinite" restart="never" nodeType="tmRoot"/>
-      </p:par>
-    </p:tnLst>
-  </p:timing>
-</p:sld>
-</file>
-
-<file path=ppt/slides/slide15.xml><?xml version="1.0" encoding="utf-8"?>
+<file path=ppt/slides/slide13.xml><?xml version="1.0" encoding="utf-8"?>
 <p:sld xmlns:a="http://schemas.openxmlformats.org/drawingml/2006/main" xmlns:r="http://schemas.openxmlformats.org/officeDocument/2006/relationships" xmlns:p="http://schemas.openxmlformats.org/presentationml/2006/main">
   <p:cSld>
     <p:spTree>
@@ -7398,7 +6879,7 @@
 </p:sld>
 </file>
 
-<file path=ppt/slides/slide16.xml><?xml version="1.0" encoding="utf-8"?>
+<file path=ppt/slides/slide14.xml><?xml version="1.0" encoding="utf-8"?>
 <p:sld xmlns:a="http://schemas.openxmlformats.org/drawingml/2006/main" xmlns:r="http://schemas.openxmlformats.org/officeDocument/2006/relationships" xmlns:p="http://schemas.openxmlformats.org/presentationml/2006/main">
   <p:cSld>
     <p:spTree>
@@ -7564,7 +7045,7 @@
 </p:sld>
 </file>
 
-<file path=ppt/slides/slide17.xml><?xml version="1.0" encoding="utf-8"?>
+<file path=ppt/slides/slide15.xml><?xml version="1.0" encoding="utf-8"?>
 <p:sld xmlns:a="http://schemas.openxmlformats.org/drawingml/2006/main" xmlns:r="http://schemas.openxmlformats.org/officeDocument/2006/relationships" xmlns:p="http://schemas.openxmlformats.org/presentationml/2006/main">
   <p:cSld>
     <p:spTree>
@@ -7730,7 +7211,7 @@
 </p:sld>
 </file>
 
-<file path=ppt/slides/slide18.xml><?xml version="1.0" encoding="utf-8"?>
+<file path=ppt/slides/slide16.xml><?xml version="1.0" encoding="utf-8"?>
 <p:sld xmlns:a="http://schemas.openxmlformats.org/drawingml/2006/main" xmlns:r="http://schemas.openxmlformats.org/officeDocument/2006/relationships" xmlns:p="http://schemas.openxmlformats.org/presentationml/2006/main">
   <p:cSld>
     <p:spTree>
@@ -7896,7 +7377,7 @@
 </p:sld>
 </file>
 
-<file path=ppt/slides/slide19.xml><?xml version="1.0" encoding="utf-8"?>
+<file path=ppt/slides/slide17.xml><?xml version="1.0" encoding="utf-8"?>
 <p:sld xmlns:a="http://schemas.openxmlformats.org/drawingml/2006/main" xmlns:r="http://schemas.openxmlformats.org/officeDocument/2006/relationships" xmlns:p="http://schemas.openxmlformats.org/presentationml/2006/main">
   <p:cSld>
     <p:spTree>
@@ -8086,342 +7567,7 @@
 </p:sld>
 </file>
 
-<file path=ppt/slides/slide2.xml><?xml version="1.0" encoding="utf-8"?>
-<p:sld xmlns:a="http://schemas.openxmlformats.org/drawingml/2006/main" xmlns:r="http://schemas.openxmlformats.org/officeDocument/2006/relationships" xmlns:p="http://schemas.openxmlformats.org/presentationml/2006/main">
-  <p:cSld>
-    <p:spTree>
-      <p:nvGrpSpPr>
-        <p:cNvPr id="1" name=""/>
-        <p:cNvGrpSpPr/>
-        <p:nvPr/>
-      </p:nvGrpSpPr>
-      <p:grpSpPr>
-        <a:xfrm>
-          <a:off x="0" y="0"/>
-          <a:ext cx="0" cy="0"/>
-          <a:chOff x="0" y="0"/>
-          <a:chExt cx="0" cy="0"/>
-        </a:xfrm>
-      </p:grpSpPr>
-      <p:sp>
-        <p:nvSpPr>
-          <p:cNvPr id="4" name="Rectangle 3"/>
-          <p:cNvSpPr/>
-          <p:nvPr/>
-        </p:nvSpPr>
-        <p:spPr>
-          <a:xfrm>
-            <a:off x="0" y="0"/>
-            <a:ext cx="12191999" cy="1056290"/>
-          </a:xfrm>
-          <a:prstGeom prst="rect">
-            <a:avLst/>
-          </a:prstGeom>
-          <a:solidFill>
-            <a:srgbClr val="68217A"/>
-          </a:solidFill>
-          <a:ln>
-            <a:noFill/>
-          </a:ln>
-        </p:spPr>
-        <p:style>
-          <a:lnRef idx="2">
-            <a:schemeClr val="accent1">
-              <a:shade val="50000"/>
-            </a:schemeClr>
-          </a:lnRef>
-          <a:fillRef idx="1">
-            <a:schemeClr val="accent1"/>
-          </a:fillRef>
-          <a:effectRef idx="0">
-            <a:schemeClr val="accent1"/>
-          </a:effectRef>
-          <a:fontRef idx="minor">
-            <a:schemeClr val="lt1"/>
-          </a:fontRef>
-        </p:style>
-        <p:txBody>
-          <a:bodyPr rtlCol="0" anchor="ctr"/>
-          <a:lstStyle/>
-          <a:p>
-            <a:pPr algn="r"/>
-            <a:endParaRPr lang="en-US" b="1" i="1" dirty="0"/>
-          </a:p>
-        </p:txBody>
-      </p:sp>
-      <p:sp>
-        <p:nvSpPr>
-          <p:cNvPr id="5" name="TextBox 4"/>
-          <p:cNvSpPr txBox="1"/>
-          <p:nvPr/>
-        </p:nvSpPr>
-        <p:spPr>
-          <a:xfrm>
-            <a:off x="320566" y="290929"/>
-            <a:ext cx="577402" cy="400110"/>
-          </a:xfrm>
-          <a:prstGeom prst="rect">
-            <a:avLst/>
-          </a:prstGeom>
-          <a:noFill/>
-        </p:spPr>
-        <p:txBody>
-          <a:bodyPr wrap="none" rtlCol="0">
-            <a:spAutoFit/>
-          </a:bodyPr>
-          <a:lstStyle/>
-          <a:p>
-            <a:r>
-              <a:rPr lang="en-GB" sz="2000" dirty="0" smtClean="0">
-                <a:solidFill>
-                  <a:schemeClr val="bg1"/>
-                </a:solidFill>
-                <a:latin typeface="Roboto Thin" pitchFamily="2" charset="0"/>
-                <a:ea typeface="Roboto Thin" pitchFamily="2" charset="0"/>
-              </a:rPr>
-              <a:t>BIO</a:t>
-            </a:r>
-            <a:endParaRPr lang="en-US" sz="2000" dirty="0">
-              <a:solidFill>
-                <a:schemeClr val="bg1"/>
-              </a:solidFill>
-              <a:latin typeface="Roboto Thin" pitchFamily="2" charset="0"/>
-              <a:ea typeface="Roboto Thin" pitchFamily="2" charset="0"/>
-            </a:endParaRPr>
-          </a:p>
-        </p:txBody>
-      </p:sp>
-      <p:pic>
-        <p:nvPicPr>
-          <p:cNvPr id="7" name="Picture 6"/>
-          <p:cNvPicPr>
-            <a:picLocks noChangeAspect="1"/>
-          </p:cNvPicPr>
-          <p:nvPr/>
-        </p:nvPicPr>
-        <p:blipFill rotWithShape="1">
-          <a:blip r:embed="rId3">
-            <a:extLst>
-              <a:ext uri="{28A0092B-C50C-407E-A947-70E740481C1C}">
-                <a14:useLocalDpi xmlns:a14="http://schemas.microsoft.com/office/drawing/2010/main" val="0"/>
-              </a:ext>
-            </a:extLst>
-          </a:blip>
-          <a:srcRect l="27403" t="23645" r="34183" b="20629"/>
-          <a:stretch/>
-        </p:blipFill>
-        <p:spPr>
-          <a:xfrm>
-            <a:off x="1270813" y="1712978"/>
-            <a:ext cx="2732952" cy="2960291"/>
-          </a:xfrm>
-          <a:prstGeom prst="ellipse">
-            <a:avLst/>
-          </a:prstGeom>
-          <a:ln w="38100" cap="rnd">
-            <a:solidFill>
-              <a:srgbClr val="696657"/>
-            </a:solidFill>
-            <a:prstDash val="solid"/>
-          </a:ln>
-          <a:effectLst/>
-          <a:scene3d>
-            <a:camera prst="perspectiveFront" fov="5400000"/>
-            <a:lightRig rig="threePt" dir="t">
-              <a:rot lat="0" lon="0" rev="19200000"/>
-            </a:lightRig>
-          </a:scene3d>
-          <a:sp3d extrusionH="25400">
-            <a:extrusionClr>
-              <a:srgbClr val="000000"/>
-            </a:extrusionClr>
-          </a:sp3d>
-        </p:spPr>
-      </p:pic>
-      <p:sp>
-        <p:nvSpPr>
-          <p:cNvPr id="8" name="TextBox 7"/>
-          <p:cNvSpPr txBox="1"/>
-          <p:nvPr/>
-        </p:nvSpPr>
-        <p:spPr>
-          <a:xfrm>
-            <a:off x="5328970" y="1712978"/>
-            <a:ext cx="6863029" cy="3724096"/>
-          </a:xfrm>
-          <a:prstGeom prst="rect">
-            <a:avLst/>
-          </a:prstGeom>
-          <a:noFill/>
-        </p:spPr>
-        <p:txBody>
-          <a:bodyPr wrap="square" rtlCol="0">
-            <a:spAutoFit/>
-          </a:bodyPr>
-          <a:lstStyle/>
-          <a:p>
-            <a:r>
-              <a:rPr lang="en-GB" sz="2800" dirty="0" smtClean="0">
-                <a:latin typeface="Roboto Light" panose="02000000000000000000" pitchFamily="2" charset="0"/>
-                <a:ea typeface="Roboto Light" panose="02000000000000000000" pitchFamily="2" charset="0"/>
-              </a:rPr>
-              <a:t>Jordi Ruiz Jim</a:t>
-            </a:r>
-            <a:r>
-              <a:rPr lang="en-US" sz="2800" dirty="0" smtClean="0">
-                <a:latin typeface="Roboto Light" panose="02000000000000000000" pitchFamily="2" charset="0"/>
-                <a:ea typeface="Roboto Light" panose="02000000000000000000" pitchFamily="2" charset="0"/>
-              </a:rPr>
-              <a:t>énez</a:t>
-            </a:r>
-          </a:p>
-          <a:p>
-            <a:r>
-              <a:rPr lang="en-GB" sz="2800" dirty="0">
-                <a:latin typeface="Roboto Black" panose="02000000000000000000" pitchFamily="2" charset="0"/>
-                <a:ea typeface="Roboto Black" panose="02000000000000000000" pitchFamily="2" charset="0"/>
-              </a:rPr>
-              <a:t>FULLSTACK</a:t>
-            </a:r>
-            <a:r>
-              <a:rPr lang="en-GB" sz="2800" dirty="0">
-                <a:latin typeface="Roboto Light" panose="02000000000000000000" pitchFamily="2" charset="0"/>
-                <a:ea typeface="Roboto Light" panose="02000000000000000000" pitchFamily="2" charset="0"/>
-              </a:rPr>
-              <a:t> developer</a:t>
-            </a:r>
-          </a:p>
-          <a:p>
-            <a:endParaRPr lang="en-GB" dirty="0">
-              <a:latin typeface="Roboto Light" panose="02000000000000000000" pitchFamily="2" charset="0"/>
-              <a:ea typeface="Roboto Light" panose="02000000000000000000" pitchFamily="2" charset="0"/>
-            </a:endParaRPr>
-          </a:p>
-          <a:p>
-            <a:endParaRPr lang="en-GB" dirty="0" smtClean="0">
-              <a:latin typeface="Roboto Light" panose="02000000000000000000" pitchFamily="2" charset="0"/>
-              <a:ea typeface="Roboto Light" panose="02000000000000000000" pitchFamily="2" charset="0"/>
-            </a:endParaRPr>
-          </a:p>
-          <a:p>
-            <a:endParaRPr lang="en-GB" dirty="0">
-              <a:latin typeface="Roboto Light" panose="02000000000000000000" pitchFamily="2" charset="0"/>
-              <a:ea typeface="Roboto Light" panose="02000000000000000000" pitchFamily="2" charset="0"/>
-            </a:endParaRPr>
-          </a:p>
-          <a:p>
-            <a:r>
-              <a:rPr lang="en-GB" dirty="0" smtClean="0">
-                <a:latin typeface="Roboto Light" panose="02000000000000000000" pitchFamily="2" charset="0"/>
-                <a:ea typeface="Roboto Light" panose="02000000000000000000" pitchFamily="2" charset="0"/>
-                <a:hlinkClick r:id="rId4"/>
-              </a:rPr>
-              <a:t>https</a:t>
-            </a:r>
-            <a:r>
-              <a:rPr lang="en-GB" dirty="0">
-                <a:latin typeface="Roboto Light" panose="02000000000000000000" pitchFamily="2" charset="0"/>
-                <a:ea typeface="Roboto Light" panose="02000000000000000000" pitchFamily="2" charset="0"/>
-                <a:hlinkClick r:id="rId4"/>
-              </a:rPr>
-              <a:t>://www.linkedin.com/in/jordiruizj</a:t>
-            </a:r>
-            <a:r>
-              <a:rPr lang="en-GB" dirty="0" smtClean="0">
-                <a:latin typeface="Roboto Light" panose="02000000000000000000" pitchFamily="2" charset="0"/>
-                <a:ea typeface="Roboto Light" panose="02000000000000000000" pitchFamily="2" charset="0"/>
-                <a:hlinkClick r:id="rId4"/>
-              </a:rPr>
-              <a:t>/</a:t>
-            </a:r>
-            <a:endParaRPr lang="en-GB" dirty="0" smtClean="0">
-              <a:latin typeface="Roboto Light" panose="02000000000000000000" pitchFamily="2" charset="0"/>
-              <a:ea typeface="Roboto Light" panose="02000000000000000000" pitchFamily="2" charset="0"/>
-            </a:endParaRPr>
-          </a:p>
-          <a:p>
-            <a:r>
-              <a:rPr lang="en-GB" dirty="0">
-                <a:latin typeface="Roboto Light" panose="02000000000000000000" pitchFamily="2" charset="0"/>
-                <a:ea typeface="Roboto Light" panose="02000000000000000000" pitchFamily="2" charset="0"/>
-                <a:hlinkClick r:id="rId5"/>
-              </a:rPr>
-              <a:t>https://</a:t>
-            </a:r>
-            <a:r>
-              <a:rPr lang="en-GB" dirty="0" smtClean="0">
-                <a:latin typeface="Roboto Light" panose="02000000000000000000" pitchFamily="2" charset="0"/>
-                <a:ea typeface="Roboto Light" panose="02000000000000000000" pitchFamily="2" charset="0"/>
-                <a:hlinkClick r:id="rId5"/>
-              </a:rPr>
-              <a:t>twitter.com/jruizx</a:t>
-            </a:r>
-            <a:endParaRPr lang="en-GB" dirty="0" smtClean="0">
-              <a:latin typeface="Roboto Light" panose="02000000000000000000" pitchFamily="2" charset="0"/>
-              <a:ea typeface="Roboto Light" panose="02000000000000000000" pitchFamily="2" charset="0"/>
-            </a:endParaRPr>
-          </a:p>
-          <a:p>
-            <a:r>
-              <a:rPr lang="en-GB" dirty="0">
-                <a:latin typeface="Roboto Light" panose="02000000000000000000" pitchFamily="2" charset="0"/>
-                <a:ea typeface="Roboto Light" panose="02000000000000000000" pitchFamily="2" charset="0"/>
-                <a:hlinkClick r:id="rId6"/>
-              </a:rPr>
-              <a:t>https://github.com/jruizx</a:t>
-            </a:r>
-            <a:endParaRPr lang="en-GB" dirty="0" smtClean="0">
-              <a:latin typeface="Roboto Light" panose="02000000000000000000" pitchFamily="2" charset="0"/>
-              <a:ea typeface="Roboto Light" panose="02000000000000000000" pitchFamily="2" charset="0"/>
-            </a:endParaRPr>
-          </a:p>
-          <a:p>
-            <a:endParaRPr lang="en-GB" b="1" dirty="0" smtClean="0">
-              <a:latin typeface="Roboto Light" panose="02000000000000000000" pitchFamily="2" charset="0"/>
-              <a:ea typeface="Roboto Light" panose="02000000000000000000" pitchFamily="2" charset="0"/>
-            </a:endParaRPr>
-          </a:p>
-          <a:p>
-            <a:endParaRPr lang="en-GB" b="1" dirty="0" smtClean="0">
-              <a:latin typeface="Roboto Light" panose="02000000000000000000" pitchFamily="2" charset="0"/>
-              <a:ea typeface="Roboto Light" panose="02000000000000000000" pitchFamily="2" charset="0"/>
-            </a:endParaRPr>
-          </a:p>
-          <a:p>
-            <a:endParaRPr lang="en-GB" b="1" dirty="0" smtClean="0">
-              <a:latin typeface="Roboto Light" panose="02000000000000000000" pitchFamily="2" charset="0"/>
-              <a:ea typeface="Roboto Light" panose="02000000000000000000" pitchFamily="2" charset="0"/>
-            </a:endParaRPr>
-          </a:p>
-          <a:p>
-            <a:endParaRPr lang="en-US" b="1" dirty="0">
-              <a:latin typeface="Roboto Light" panose="02000000000000000000" pitchFamily="2" charset="0"/>
-              <a:ea typeface="Roboto Light" panose="02000000000000000000" pitchFamily="2" charset="0"/>
-            </a:endParaRPr>
-          </a:p>
-        </p:txBody>
-      </p:sp>
-    </p:spTree>
-    <p:extLst>
-      <p:ext uri="{BB962C8B-B14F-4D97-AF65-F5344CB8AC3E}">
-        <p14:creationId xmlns:p14="http://schemas.microsoft.com/office/powerpoint/2010/main" val="1398727450"/>
-      </p:ext>
-    </p:extLst>
-  </p:cSld>
-  <p:clrMapOvr>
-    <a:masterClrMapping/>
-  </p:clrMapOvr>
-  <p:timing>
-    <p:tnLst>
-      <p:par>
-        <p:cTn id="1" dur="indefinite" restart="never" nodeType="tmRoot"/>
-      </p:par>
-    </p:tnLst>
-  </p:timing>
-</p:sld>
-</file>
-
-<file path=ppt/slides/slide20.xml><?xml version="1.0" encoding="utf-8"?>
+<file path=ppt/slides/slide18.xml><?xml version="1.0" encoding="utf-8"?>
 <p:sld xmlns:a="http://schemas.openxmlformats.org/drawingml/2006/main" xmlns:r="http://schemas.openxmlformats.org/officeDocument/2006/relationships" xmlns:p="http://schemas.openxmlformats.org/presentationml/2006/main">
   <p:cSld>
     <p:spTree>
@@ -8587,78 +7733,7 @@
 </p:sld>
 </file>
 
-<file path=ppt/slides/slide21.xml><?xml version="1.0" encoding="utf-8"?>
-<p:sld xmlns:a="http://schemas.openxmlformats.org/drawingml/2006/main" xmlns:r="http://schemas.openxmlformats.org/officeDocument/2006/relationships" xmlns:p="http://schemas.openxmlformats.org/presentationml/2006/main">
-  <p:cSld>
-    <p:spTree>
-      <p:nvGrpSpPr>
-        <p:cNvPr id="1" name=""/>
-        <p:cNvGrpSpPr/>
-        <p:nvPr/>
-      </p:nvGrpSpPr>
-      <p:grpSpPr>
-        <a:xfrm>
-          <a:off x="0" y="0"/>
-          <a:ext cx="0" cy="0"/>
-          <a:chOff x="0" y="0"/>
-          <a:chExt cx="0" cy="0"/>
-        </a:xfrm>
-      </p:grpSpPr>
-      <p:pic>
-        <p:nvPicPr>
-          <p:cNvPr id="2050" name="Picture 2" descr="Image result for madame gazelle"/>
-          <p:cNvPicPr>
-            <a:picLocks noChangeAspect="1" noChangeArrowheads="1"/>
-          </p:cNvPicPr>
-          <p:nvPr/>
-        </p:nvPicPr>
-        <p:blipFill>
-          <a:blip r:embed="rId3">
-            <a:extLst>
-              <a:ext uri="{28A0092B-C50C-407E-A947-70E740481C1C}">
-                <a14:useLocalDpi xmlns:a14="http://schemas.microsoft.com/office/drawing/2010/main" val="0"/>
-              </a:ext>
-            </a:extLst>
-          </a:blip>
-          <a:srcRect/>
-          <a:stretch>
-            <a:fillRect/>
-          </a:stretch>
-        </p:blipFill>
-        <p:spPr bwMode="auto">
-          <a:xfrm>
-            <a:off x="2286000" y="733425"/>
-            <a:ext cx="7620000" cy="5391151"/>
-          </a:xfrm>
-          <a:prstGeom prst="rect">
-            <a:avLst/>
-          </a:prstGeom>
-          <a:noFill/>
-          <a:extLst>
-            <a:ext uri="{909E8E84-426E-40DD-AFC4-6F175D3DCCD1}">
-              <a14:hiddenFill xmlns:a14="http://schemas.microsoft.com/office/drawing/2010/main">
-                <a:solidFill>
-                  <a:srgbClr val="FFFFFF"/>
-                </a:solidFill>
-              </a14:hiddenFill>
-            </a:ext>
-          </a:extLst>
-        </p:spPr>
-      </p:pic>
-    </p:spTree>
-    <p:extLst>
-      <p:ext uri="{BB962C8B-B14F-4D97-AF65-F5344CB8AC3E}">
-        <p14:creationId xmlns:p14="http://schemas.microsoft.com/office/powerpoint/2010/main" val="959043897"/>
-      </p:ext>
-    </p:extLst>
-  </p:cSld>
-  <p:clrMapOvr>
-    <a:masterClrMapping/>
-  </p:clrMapOvr>
-</p:sld>
-</file>
-
-<file path=ppt/slides/slide22.xml><?xml version="1.0" encoding="utf-8"?>
+<file path=ppt/slides/slide19.xml><?xml version="1.0" encoding="utf-8"?>
 <p:sld xmlns:a="http://schemas.openxmlformats.org/drawingml/2006/main" xmlns:r="http://schemas.openxmlformats.org/officeDocument/2006/relationships" xmlns:p="http://schemas.openxmlformats.org/presentationml/2006/main">
   <p:cSld>
     <p:spTree>
@@ -8807,7 +7882,342 @@
 </p:sld>
 </file>
 
-<file path=ppt/slides/slide23.xml><?xml version="1.0" encoding="utf-8"?>
+<file path=ppt/slides/slide2.xml><?xml version="1.0" encoding="utf-8"?>
+<p:sld xmlns:a="http://schemas.openxmlformats.org/drawingml/2006/main" xmlns:r="http://schemas.openxmlformats.org/officeDocument/2006/relationships" xmlns:p="http://schemas.openxmlformats.org/presentationml/2006/main">
+  <p:cSld>
+    <p:spTree>
+      <p:nvGrpSpPr>
+        <p:cNvPr id="1" name=""/>
+        <p:cNvGrpSpPr/>
+        <p:nvPr/>
+      </p:nvGrpSpPr>
+      <p:grpSpPr>
+        <a:xfrm>
+          <a:off x="0" y="0"/>
+          <a:ext cx="0" cy="0"/>
+          <a:chOff x="0" y="0"/>
+          <a:chExt cx="0" cy="0"/>
+        </a:xfrm>
+      </p:grpSpPr>
+      <p:sp>
+        <p:nvSpPr>
+          <p:cNvPr id="4" name="Rectangle 3"/>
+          <p:cNvSpPr/>
+          <p:nvPr/>
+        </p:nvSpPr>
+        <p:spPr>
+          <a:xfrm>
+            <a:off x="0" y="0"/>
+            <a:ext cx="12191999" cy="1056290"/>
+          </a:xfrm>
+          <a:prstGeom prst="rect">
+            <a:avLst/>
+          </a:prstGeom>
+          <a:solidFill>
+            <a:srgbClr val="68217A"/>
+          </a:solidFill>
+          <a:ln>
+            <a:noFill/>
+          </a:ln>
+        </p:spPr>
+        <p:style>
+          <a:lnRef idx="2">
+            <a:schemeClr val="accent1">
+              <a:shade val="50000"/>
+            </a:schemeClr>
+          </a:lnRef>
+          <a:fillRef idx="1">
+            <a:schemeClr val="accent1"/>
+          </a:fillRef>
+          <a:effectRef idx="0">
+            <a:schemeClr val="accent1"/>
+          </a:effectRef>
+          <a:fontRef idx="minor">
+            <a:schemeClr val="lt1"/>
+          </a:fontRef>
+        </p:style>
+        <p:txBody>
+          <a:bodyPr rtlCol="0" anchor="ctr"/>
+          <a:lstStyle/>
+          <a:p>
+            <a:pPr algn="r"/>
+            <a:endParaRPr lang="en-US" b="1" i="1" dirty="0"/>
+          </a:p>
+        </p:txBody>
+      </p:sp>
+      <p:sp>
+        <p:nvSpPr>
+          <p:cNvPr id="5" name="TextBox 4"/>
+          <p:cNvSpPr txBox="1"/>
+          <p:nvPr/>
+        </p:nvSpPr>
+        <p:spPr>
+          <a:xfrm>
+            <a:off x="320566" y="290929"/>
+            <a:ext cx="577402" cy="400110"/>
+          </a:xfrm>
+          <a:prstGeom prst="rect">
+            <a:avLst/>
+          </a:prstGeom>
+          <a:noFill/>
+        </p:spPr>
+        <p:txBody>
+          <a:bodyPr wrap="none" rtlCol="0">
+            <a:spAutoFit/>
+          </a:bodyPr>
+          <a:lstStyle/>
+          <a:p>
+            <a:r>
+              <a:rPr lang="en-GB" sz="2000" dirty="0" smtClean="0">
+                <a:solidFill>
+                  <a:schemeClr val="bg1"/>
+                </a:solidFill>
+                <a:latin typeface="Roboto Thin" pitchFamily="2" charset="0"/>
+                <a:ea typeface="Roboto Thin" pitchFamily="2" charset="0"/>
+              </a:rPr>
+              <a:t>BIO</a:t>
+            </a:r>
+            <a:endParaRPr lang="en-US" sz="2000" dirty="0">
+              <a:solidFill>
+                <a:schemeClr val="bg1"/>
+              </a:solidFill>
+              <a:latin typeface="Roboto Thin" pitchFamily="2" charset="0"/>
+              <a:ea typeface="Roboto Thin" pitchFamily="2" charset="0"/>
+            </a:endParaRPr>
+          </a:p>
+        </p:txBody>
+      </p:sp>
+      <p:pic>
+        <p:nvPicPr>
+          <p:cNvPr id="7" name="Picture 6"/>
+          <p:cNvPicPr>
+            <a:picLocks noChangeAspect="1"/>
+          </p:cNvPicPr>
+          <p:nvPr/>
+        </p:nvPicPr>
+        <p:blipFill rotWithShape="1">
+          <a:blip r:embed="rId3">
+            <a:extLst>
+              <a:ext uri="{28A0092B-C50C-407E-A947-70E740481C1C}">
+                <a14:useLocalDpi xmlns:a14="http://schemas.microsoft.com/office/drawing/2010/main" val="0"/>
+              </a:ext>
+            </a:extLst>
+          </a:blip>
+          <a:srcRect l="27403" t="23645" r="34183" b="20629"/>
+          <a:stretch/>
+        </p:blipFill>
+        <p:spPr>
+          <a:xfrm>
+            <a:off x="1270813" y="1712978"/>
+            <a:ext cx="2732952" cy="2960291"/>
+          </a:xfrm>
+          <a:prstGeom prst="ellipse">
+            <a:avLst/>
+          </a:prstGeom>
+          <a:ln w="38100" cap="rnd">
+            <a:solidFill>
+              <a:srgbClr val="696657"/>
+            </a:solidFill>
+            <a:prstDash val="solid"/>
+          </a:ln>
+          <a:effectLst/>
+          <a:scene3d>
+            <a:camera prst="perspectiveFront" fov="5400000"/>
+            <a:lightRig rig="threePt" dir="t">
+              <a:rot lat="0" lon="0" rev="19200000"/>
+            </a:lightRig>
+          </a:scene3d>
+          <a:sp3d extrusionH="25400">
+            <a:extrusionClr>
+              <a:srgbClr val="000000"/>
+            </a:extrusionClr>
+          </a:sp3d>
+        </p:spPr>
+      </p:pic>
+      <p:sp>
+        <p:nvSpPr>
+          <p:cNvPr id="8" name="TextBox 7"/>
+          <p:cNvSpPr txBox="1"/>
+          <p:nvPr/>
+        </p:nvSpPr>
+        <p:spPr>
+          <a:xfrm>
+            <a:off x="5328970" y="1712978"/>
+            <a:ext cx="6863029" cy="3724096"/>
+          </a:xfrm>
+          <a:prstGeom prst="rect">
+            <a:avLst/>
+          </a:prstGeom>
+          <a:noFill/>
+        </p:spPr>
+        <p:txBody>
+          <a:bodyPr wrap="square" rtlCol="0">
+            <a:spAutoFit/>
+          </a:bodyPr>
+          <a:lstStyle/>
+          <a:p>
+            <a:r>
+              <a:rPr lang="en-GB" sz="2800" dirty="0" smtClean="0">
+                <a:latin typeface="Roboto Light" panose="02000000000000000000" pitchFamily="2" charset="0"/>
+                <a:ea typeface="Roboto Light" panose="02000000000000000000" pitchFamily="2" charset="0"/>
+              </a:rPr>
+              <a:t>Jordi Ruiz Jim</a:t>
+            </a:r>
+            <a:r>
+              <a:rPr lang="en-US" sz="2800" dirty="0" smtClean="0">
+                <a:latin typeface="Roboto Light" panose="02000000000000000000" pitchFamily="2" charset="0"/>
+                <a:ea typeface="Roboto Light" panose="02000000000000000000" pitchFamily="2" charset="0"/>
+              </a:rPr>
+              <a:t>énez</a:t>
+            </a:r>
+          </a:p>
+          <a:p>
+            <a:r>
+              <a:rPr lang="en-GB" sz="2800" dirty="0">
+                <a:latin typeface="Roboto Black" panose="02000000000000000000" pitchFamily="2" charset="0"/>
+                <a:ea typeface="Roboto Black" panose="02000000000000000000" pitchFamily="2" charset="0"/>
+              </a:rPr>
+              <a:t>FULLSTACK</a:t>
+            </a:r>
+            <a:r>
+              <a:rPr lang="en-GB" sz="2800" dirty="0">
+                <a:latin typeface="Roboto Light" panose="02000000000000000000" pitchFamily="2" charset="0"/>
+                <a:ea typeface="Roboto Light" panose="02000000000000000000" pitchFamily="2" charset="0"/>
+              </a:rPr>
+              <a:t> developer</a:t>
+            </a:r>
+          </a:p>
+          <a:p>
+            <a:endParaRPr lang="en-GB" dirty="0">
+              <a:latin typeface="Roboto Light" panose="02000000000000000000" pitchFamily="2" charset="0"/>
+              <a:ea typeface="Roboto Light" panose="02000000000000000000" pitchFamily="2" charset="0"/>
+            </a:endParaRPr>
+          </a:p>
+          <a:p>
+            <a:endParaRPr lang="en-GB" dirty="0" smtClean="0">
+              <a:latin typeface="Roboto Light" panose="02000000000000000000" pitchFamily="2" charset="0"/>
+              <a:ea typeface="Roboto Light" panose="02000000000000000000" pitchFamily="2" charset="0"/>
+            </a:endParaRPr>
+          </a:p>
+          <a:p>
+            <a:endParaRPr lang="en-GB" dirty="0">
+              <a:latin typeface="Roboto Light" panose="02000000000000000000" pitchFamily="2" charset="0"/>
+              <a:ea typeface="Roboto Light" panose="02000000000000000000" pitchFamily="2" charset="0"/>
+            </a:endParaRPr>
+          </a:p>
+          <a:p>
+            <a:r>
+              <a:rPr lang="en-GB" dirty="0" smtClean="0">
+                <a:latin typeface="Roboto Light" panose="02000000000000000000" pitchFamily="2" charset="0"/>
+                <a:ea typeface="Roboto Light" panose="02000000000000000000" pitchFamily="2" charset="0"/>
+                <a:hlinkClick r:id="rId4"/>
+              </a:rPr>
+              <a:t>https</a:t>
+            </a:r>
+            <a:r>
+              <a:rPr lang="en-GB" dirty="0">
+                <a:latin typeface="Roboto Light" panose="02000000000000000000" pitchFamily="2" charset="0"/>
+                <a:ea typeface="Roboto Light" panose="02000000000000000000" pitchFamily="2" charset="0"/>
+                <a:hlinkClick r:id="rId4"/>
+              </a:rPr>
+              <a:t>://www.linkedin.com/in/jordiruizj</a:t>
+            </a:r>
+            <a:r>
+              <a:rPr lang="en-GB" dirty="0" smtClean="0">
+                <a:latin typeface="Roboto Light" panose="02000000000000000000" pitchFamily="2" charset="0"/>
+                <a:ea typeface="Roboto Light" panose="02000000000000000000" pitchFamily="2" charset="0"/>
+                <a:hlinkClick r:id="rId4"/>
+              </a:rPr>
+              <a:t>/</a:t>
+            </a:r>
+            <a:endParaRPr lang="en-GB" dirty="0" smtClean="0">
+              <a:latin typeface="Roboto Light" panose="02000000000000000000" pitchFamily="2" charset="0"/>
+              <a:ea typeface="Roboto Light" panose="02000000000000000000" pitchFamily="2" charset="0"/>
+            </a:endParaRPr>
+          </a:p>
+          <a:p>
+            <a:r>
+              <a:rPr lang="en-GB" dirty="0">
+                <a:latin typeface="Roboto Light" panose="02000000000000000000" pitchFamily="2" charset="0"/>
+                <a:ea typeface="Roboto Light" panose="02000000000000000000" pitchFamily="2" charset="0"/>
+                <a:hlinkClick r:id="rId5"/>
+              </a:rPr>
+              <a:t>https://</a:t>
+            </a:r>
+            <a:r>
+              <a:rPr lang="en-GB" dirty="0" smtClean="0">
+                <a:latin typeface="Roboto Light" panose="02000000000000000000" pitchFamily="2" charset="0"/>
+                <a:ea typeface="Roboto Light" panose="02000000000000000000" pitchFamily="2" charset="0"/>
+                <a:hlinkClick r:id="rId5"/>
+              </a:rPr>
+              <a:t>twitter.com/jruizx</a:t>
+            </a:r>
+            <a:endParaRPr lang="en-GB" dirty="0" smtClean="0">
+              <a:latin typeface="Roboto Light" panose="02000000000000000000" pitchFamily="2" charset="0"/>
+              <a:ea typeface="Roboto Light" panose="02000000000000000000" pitchFamily="2" charset="0"/>
+            </a:endParaRPr>
+          </a:p>
+          <a:p>
+            <a:r>
+              <a:rPr lang="en-GB" dirty="0">
+                <a:latin typeface="Roboto Light" panose="02000000000000000000" pitchFamily="2" charset="0"/>
+                <a:ea typeface="Roboto Light" panose="02000000000000000000" pitchFamily="2" charset="0"/>
+                <a:hlinkClick r:id="rId6"/>
+              </a:rPr>
+              <a:t>https://github.com/jruizx</a:t>
+            </a:r>
+            <a:endParaRPr lang="en-GB" dirty="0" smtClean="0">
+              <a:latin typeface="Roboto Light" panose="02000000000000000000" pitchFamily="2" charset="0"/>
+              <a:ea typeface="Roboto Light" panose="02000000000000000000" pitchFamily="2" charset="0"/>
+            </a:endParaRPr>
+          </a:p>
+          <a:p>
+            <a:endParaRPr lang="en-GB" b="1" dirty="0" smtClean="0">
+              <a:latin typeface="Roboto Light" panose="02000000000000000000" pitchFamily="2" charset="0"/>
+              <a:ea typeface="Roboto Light" panose="02000000000000000000" pitchFamily="2" charset="0"/>
+            </a:endParaRPr>
+          </a:p>
+          <a:p>
+            <a:endParaRPr lang="en-GB" b="1" dirty="0" smtClean="0">
+              <a:latin typeface="Roboto Light" panose="02000000000000000000" pitchFamily="2" charset="0"/>
+              <a:ea typeface="Roboto Light" panose="02000000000000000000" pitchFamily="2" charset="0"/>
+            </a:endParaRPr>
+          </a:p>
+          <a:p>
+            <a:endParaRPr lang="en-GB" b="1" dirty="0" smtClean="0">
+              <a:latin typeface="Roboto Light" panose="02000000000000000000" pitchFamily="2" charset="0"/>
+              <a:ea typeface="Roboto Light" panose="02000000000000000000" pitchFamily="2" charset="0"/>
+            </a:endParaRPr>
+          </a:p>
+          <a:p>
+            <a:endParaRPr lang="en-US" b="1" dirty="0">
+              <a:latin typeface="Roboto Light" panose="02000000000000000000" pitchFamily="2" charset="0"/>
+              <a:ea typeface="Roboto Light" panose="02000000000000000000" pitchFamily="2" charset="0"/>
+            </a:endParaRPr>
+          </a:p>
+        </p:txBody>
+      </p:sp>
+    </p:spTree>
+    <p:extLst>
+      <p:ext uri="{BB962C8B-B14F-4D97-AF65-F5344CB8AC3E}">
+        <p14:creationId xmlns:p14="http://schemas.microsoft.com/office/powerpoint/2010/main" val="1398727450"/>
+      </p:ext>
+    </p:extLst>
+  </p:cSld>
+  <p:clrMapOvr>
+    <a:masterClrMapping/>
+  </p:clrMapOvr>
+  <p:timing>
+    <p:tnLst>
+      <p:par>
+        <p:cTn id="1" dur="indefinite" restart="never" nodeType="tmRoot"/>
+      </p:par>
+    </p:tnLst>
+  </p:timing>
+</p:sld>
+</file>
+
+<file path=ppt/slides/slide20.xml><?xml version="1.0" encoding="utf-8"?>
 <p:sld xmlns:a="http://schemas.openxmlformats.org/drawingml/2006/main" xmlns:r="http://schemas.openxmlformats.org/officeDocument/2006/relationships" xmlns:p="http://schemas.openxmlformats.org/presentationml/2006/main">
   <p:cSld>
     <p:spTree>
@@ -8991,6 +8401,1050 @@
 </p:sld>
 </file>
 
+<file path=ppt/slides/slide21.xml><?xml version="1.0" encoding="utf-8"?>
+<p:sld xmlns:a="http://schemas.openxmlformats.org/drawingml/2006/main" xmlns:r="http://schemas.openxmlformats.org/officeDocument/2006/relationships" xmlns:p="http://schemas.openxmlformats.org/presentationml/2006/main">
+  <p:cSld>
+    <p:spTree>
+      <p:nvGrpSpPr>
+        <p:cNvPr id="1" name=""/>
+        <p:cNvGrpSpPr/>
+        <p:nvPr/>
+      </p:nvGrpSpPr>
+      <p:grpSpPr>
+        <a:xfrm>
+          <a:off x="0" y="0"/>
+          <a:ext cx="0" cy="0"/>
+          <a:chOff x="0" y="0"/>
+          <a:chExt cx="0" cy="0"/>
+        </a:xfrm>
+      </p:grpSpPr>
+      <p:sp>
+        <p:nvSpPr>
+          <p:cNvPr id="4" name="Rectangle 3"/>
+          <p:cNvSpPr/>
+          <p:nvPr/>
+        </p:nvSpPr>
+        <p:spPr>
+          <a:xfrm>
+            <a:off x="0" y="0"/>
+            <a:ext cx="12191999" cy="1056290"/>
+          </a:xfrm>
+          <a:prstGeom prst="rect">
+            <a:avLst/>
+          </a:prstGeom>
+          <a:solidFill>
+            <a:srgbClr val="68217A"/>
+          </a:solidFill>
+          <a:ln>
+            <a:noFill/>
+          </a:ln>
+        </p:spPr>
+        <p:style>
+          <a:lnRef idx="2">
+            <a:schemeClr val="accent1">
+              <a:shade val="50000"/>
+            </a:schemeClr>
+          </a:lnRef>
+          <a:fillRef idx="1">
+            <a:schemeClr val="accent1"/>
+          </a:fillRef>
+          <a:effectRef idx="0">
+            <a:schemeClr val="accent1"/>
+          </a:effectRef>
+          <a:fontRef idx="minor">
+            <a:schemeClr val="lt1"/>
+          </a:fontRef>
+        </p:style>
+        <p:txBody>
+          <a:bodyPr rtlCol="0" anchor="ctr"/>
+          <a:lstStyle/>
+          <a:p>
+            <a:pPr algn="r"/>
+            <a:endParaRPr lang="en-US" b="1" i="1" dirty="0"/>
+          </a:p>
+        </p:txBody>
+      </p:sp>
+      <p:sp>
+        <p:nvSpPr>
+          <p:cNvPr id="5" name="TextBox 4"/>
+          <p:cNvSpPr txBox="1"/>
+          <p:nvPr/>
+        </p:nvSpPr>
+        <p:spPr>
+          <a:xfrm>
+            <a:off x="320566" y="290929"/>
+            <a:ext cx="3530134" cy="400110"/>
+          </a:xfrm>
+          <a:prstGeom prst="rect">
+            <a:avLst/>
+          </a:prstGeom>
+          <a:noFill/>
+        </p:spPr>
+        <p:txBody>
+          <a:bodyPr wrap="none" rtlCol="0">
+            <a:spAutoFit/>
+          </a:bodyPr>
+          <a:lstStyle/>
+          <a:p>
+            <a:r>
+              <a:rPr lang="en-GB" sz="2000" dirty="0" smtClean="0">
+                <a:solidFill>
+                  <a:schemeClr val="bg1"/>
+                </a:solidFill>
+                <a:latin typeface="Roboto Thin" pitchFamily="2" charset="0"/>
+                <a:ea typeface="Roboto Thin" pitchFamily="2" charset="0"/>
+              </a:rPr>
+              <a:t>PROMETHEUS INTEGRATION</a:t>
+            </a:r>
+            <a:endParaRPr lang="en-US" sz="2000" dirty="0">
+              <a:solidFill>
+                <a:schemeClr val="bg1"/>
+              </a:solidFill>
+              <a:latin typeface="Roboto Thin" pitchFamily="2" charset="0"/>
+              <a:ea typeface="Roboto Thin" pitchFamily="2" charset="0"/>
+            </a:endParaRPr>
+          </a:p>
+        </p:txBody>
+      </p:sp>
+      <p:pic>
+        <p:nvPicPr>
+          <p:cNvPr id="2050" name="Picture 2" descr="Image result for database"/>
+          <p:cNvPicPr>
+            <a:picLocks noChangeAspect="1" noChangeArrowheads="1"/>
+          </p:cNvPicPr>
+          <p:nvPr/>
+        </p:nvPicPr>
+        <p:blipFill>
+          <a:blip r:embed="rId3" cstate="print">
+            <a:extLst>
+              <a:ext uri="{28A0092B-C50C-407E-A947-70E740481C1C}">
+                <a14:useLocalDpi xmlns:a14="http://schemas.microsoft.com/office/drawing/2010/main" val="0"/>
+              </a:ext>
+            </a:extLst>
+          </a:blip>
+          <a:srcRect/>
+          <a:stretch>
+            <a:fillRect/>
+          </a:stretch>
+        </p:blipFill>
+        <p:spPr bwMode="auto">
+          <a:xfrm>
+            <a:off x="1210745" y="2037562"/>
+            <a:ext cx="1151016" cy="1147699"/>
+          </a:xfrm>
+          <a:prstGeom prst="rect">
+            <a:avLst/>
+          </a:prstGeom>
+          <a:noFill/>
+          <a:extLst>
+            <a:ext uri="{909E8E84-426E-40DD-AFC4-6F175D3DCCD1}">
+              <a14:hiddenFill xmlns:a14="http://schemas.microsoft.com/office/drawing/2010/main">
+                <a:solidFill>
+                  <a:srgbClr val="FFFFFF"/>
+                </a:solidFill>
+              </a14:hiddenFill>
+            </a:ext>
+          </a:extLst>
+        </p:spPr>
+      </p:pic>
+      <p:sp>
+        <p:nvSpPr>
+          <p:cNvPr id="2" name="TextBox 1"/>
+          <p:cNvSpPr txBox="1"/>
+          <p:nvPr/>
+        </p:nvSpPr>
+        <p:spPr>
+          <a:xfrm>
+            <a:off x="563174" y="1653187"/>
+            <a:ext cx="1535998" cy="369332"/>
+          </a:xfrm>
+          <a:prstGeom prst="rect">
+            <a:avLst/>
+          </a:prstGeom>
+          <a:noFill/>
+        </p:spPr>
+        <p:txBody>
+          <a:bodyPr wrap="none" rtlCol="0">
+            <a:spAutoFit/>
+          </a:bodyPr>
+          <a:lstStyle/>
+          <a:p>
+            <a:r>
+              <a:rPr lang="en-GB" dirty="0" err="1" smtClean="0">
+                <a:latin typeface="Roboto Thin" pitchFamily="2" charset="0"/>
+                <a:ea typeface="Roboto Thin" pitchFamily="2" charset="0"/>
+              </a:rPr>
+              <a:t>ElasticSearch</a:t>
+            </a:r>
+            <a:endParaRPr lang="en-US" dirty="0">
+              <a:latin typeface="Roboto Thin" pitchFamily="2" charset="0"/>
+              <a:ea typeface="Roboto Thin" pitchFamily="2" charset="0"/>
+            </a:endParaRPr>
+          </a:p>
+        </p:txBody>
+      </p:sp>
+      <p:sp>
+        <p:nvSpPr>
+          <p:cNvPr id="7" name="TextBox 6"/>
+          <p:cNvSpPr txBox="1"/>
+          <p:nvPr/>
+        </p:nvSpPr>
+        <p:spPr>
+          <a:xfrm>
+            <a:off x="85788" y="2156814"/>
+            <a:ext cx="1178528" cy="369332"/>
+          </a:xfrm>
+          <a:prstGeom prst="rect">
+            <a:avLst/>
+          </a:prstGeom>
+          <a:noFill/>
+        </p:spPr>
+        <p:txBody>
+          <a:bodyPr wrap="none" rtlCol="0">
+            <a:spAutoFit/>
+          </a:bodyPr>
+          <a:lstStyle/>
+          <a:p>
+            <a:r>
+              <a:rPr lang="en-GB" dirty="0" smtClean="0">
+                <a:latin typeface="Roboto Thin" pitchFamily="2" charset="0"/>
+                <a:ea typeface="Roboto Thin" pitchFamily="2" charset="0"/>
+              </a:rPr>
+              <a:t>MongoDB</a:t>
+            </a:r>
+            <a:endParaRPr lang="en-US" dirty="0">
+              <a:latin typeface="Roboto Thin" pitchFamily="2" charset="0"/>
+              <a:ea typeface="Roboto Thin" pitchFamily="2" charset="0"/>
+            </a:endParaRPr>
+          </a:p>
+        </p:txBody>
+      </p:sp>
+      <p:sp>
+        <p:nvSpPr>
+          <p:cNvPr id="8" name="TextBox 7"/>
+          <p:cNvSpPr txBox="1"/>
+          <p:nvPr/>
+        </p:nvSpPr>
+        <p:spPr>
+          <a:xfrm>
+            <a:off x="85788" y="2611411"/>
+            <a:ext cx="930063" cy="369332"/>
+          </a:xfrm>
+          <a:prstGeom prst="rect">
+            <a:avLst/>
+          </a:prstGeom>
+          <a:noFill/>
+        </p:spPr>
+        <p:txBody>
+          <a:bodyPr wrap="none" rtlCol="0">
+            <a:spAutoFit/>
+          </a:bodyPr>
+          <a:lstStyle/>
+          <a:p>
+            <a:r>
+              <a:rPr lang="en-GB" dirty="0" smtClean="0">
+                <a:latin typeface="Roboto Thin" pitchFamily="2" charset="0"/>
+                <a:ea typeface="Roboto Thin" pitchFamily="2" charset="0"/>
+              </a:rPr>
+              <a:t>MSSQL</a:t>
+            </a:r>
+            <a:endParaRPr lang="en-US" dirty="0">
+              <a:latin typeface="Roboto Thin" pitchFamily="2" charset="0"/>
+              <a:ea typeface="Roboto Thin" pitchFamily="2" charset="0"/>
+            </a:endParaRPr>
+          </a:p>
+        </p:txBody>
+      </p:sp>
+      <p:sp>
+        <p:nvSpPr>
+          <p:cNvPr id="9" name="TextBox 8"/>
+          <p:cNvSpPr txBox="1"/>
+          <p:nvPr/>
+        </p:nvSpPr>
+        <p:spPr>
+          <a:xfrm>
+            <a:off x="362771" y="3035443"/>
+            <a:ext cx="902811" cy="369332"/>
+          </a:xfrm>
+          <a:prstGeom prst="rect">
+            <a:avLst/>
+          </a:prstGeom>
+          <a:noFill/>
+        </p:spPr>
+        <p:txBody>
+          <a:bodyPr wrap="none" rtlCol="0">
+            <a:spAutoFit/>
+          </a:bodyPr>
+          <a:lstStyle/>
+          <a:p>
+            <a:r>
+              <a:rPr lang="en-GB" dirty="0" smtClean="0">
+                <a:latin typeface="Roboto Thin" pitchFamily="2" charset="0"/>
+                <a:ea typeface="Roboto Thin" pitchFamily="2" charset="0"/>
+              </a:rPr>
+              <a:t>MySQL</a:t>
+            </a:r>
+            <a:endParaRPr lang="en-US" dirty="0">
+              <a:latin typeface="Roboto Thin" pitchFamily="2" charset="0"/>
+              <a:ea typeface="Roboto Thin" pitchFamily="2" charset="0"/>
+            </a:endParaRPr>
+          </a:p>
+        </p:txBody>
+      </p:sp>
+      <p:sp>
+        <p:nvSpPr>
+          <p:cNvPr id="10" name="TextBox 9"/>
+          <p:cNvSpPr txBox="1"/>
+          <p:nvPr/>
+        </p:nvSpPr>
+        <p:spPr>
+          <a:xfrm>
+            <a:off x="1065224" y="3357016"/>
+            <a:ext cx="819455" cy="369332"/>
+          </a:xfrm>
+          <a:prstGeom prst="rect">
+            <a:avLst/>
+          </a:prstGeom>
+          <a:noFill/>
+        </p:spPr>
+        <p:txBody>
+          <a:bodyPr wrap="none" rtlCol="0">
+            <a:spAutoFit/>
+          </a:bodyPr>
+          <a:lstStyle/>
+          <a:p>
+            <a:r>
+              <a:rPr lang="en-GB" dirty="0" smtClean="0">
+                <a:latin typeface="Roboto Thin" pitchFamily="2" charset="0"/>
+                <a:ea typeface="Roboto Thin" pitchFamily="2" charset="0"/>
+              </a:rPr>
+              <a:t>Oracle</a:t>
+            </a:r>
+            <a:endParaRPr lang="en-US" dirty="0">
+              <a:latin typeface="Roboto Thin" pitchFamily="2" charset="0"/>
+              <a:ea typeface="Roboto Thin" pitchFamily="2" charset="0"/>
+            </a:endParaRPr>
+          </a:p>
+        </p:txBody>
+      </p:sp>
+      <p:sp>
+        <p:nvSpPr>
+          <p:cNvPr id="11" name="TextBox 10"/>
+          <p:cNvSpPr txBox="1"/>
+          <p:nvPr/>
+        </p:nvSpPr>
+        <p:spPr>
+          <a:xfrm>
+            <a:off x="2086897" y="3118162"/>
+            <a:ext cx="1367682" cy="369332"/>
+          </a:xfrm>
+          <a:prstGeom prst="rect">
+            <a:avLst/>
+          </a:prstGeom>
+          <a:noFill/>
+        </p:spPr>
+        <p:txBody>
+          <a:bodyPr wrap="none" rtlCol="0">
+            <a:spAutoFit/>
+          </a:bodyPr>
+          <a:lstStyle/>
+          <a:p>
+            <a:r>
+              <a:rPr lang="en-GB" dirty="0" smtClean="0">
+                <a:latin typeface="Roboto Thin" pitchFamily="2" charset="0"/>
+                <a:ea typeface="Roboto Thin" pitchFamily="2" charset="0"/>
+              </a:rPr>
+              <a:t>PostgreSQL</a:t>
+            </a:r>
+            <a:endParaRPr lang="en-US" dirty="0">
+              <a:latin typeface="Roboto Thin" pitchFamily="2" charset="0"/>
+              <a:ea typeface="Roboto Thin" pitchFamily="2" charset="0"/>
+            </a:endParaRPr>
+          </a:p>
+        </p:txBody>
+      </p:sp>
+      <p:sp>
+        <p:nvSpPr>
+          <p:cNvPr id="12" name="TextBox 11"/>
+          <p:cNvSpPr txBox="1"/>
+          <p:nvPr/>
+        </p:nvSpPr>
+        <p:spPr>
+          <a:xfrm>
+            <a:off x="2361761" y="2611411"/>
+            <a:ext cx="1101584" cy="369332"/>
+          </a:xfrm>
+          <a:prstGeom prst="rect">
+            <a:avLst/>
+          </a:prstGeom>
+          <a:noFill/>
+        </p:spPr>
+        <p:txBody>
+          <a:bodyPr wrap="none" rtlCol="0">
+            <a:spAutoFit/>
+          </a:bodyPr>
+          <a:lstStyle/>
+          <a:p>
+            <a:r>
+              <a:rPr lang="en-GB" dirty="0" err="1" smtClean="0">
+                <a:latin typeface="Roboto Thin" pitchFamily="2" charset="0"/>
+                <a:ea typeface="Roboto Thin" pitchFamily="2" charset="0"/>
+              </a:rPr>
+              <a:t>RavenDB</a:t>
+            </a:r>
+            <a:endParaRPr lang="en-US" dirty="0">
+              <a:latin typeface="Roboto Thin" pitchFamily="2" charset="0"/>
+              <a:ea typeface="Roboto Thin" pitchFamily="2" charset="0"/>
+            </a:endParaRPr>
+          </a:p>
+        </p:txBody>
+      </p:sp>
+      <p:sp>
+        <p:nvSpPr>
+          <p:cNvPr id="13" name="TextBox 12"/>
+          <p:cNvSpPr txBox="1"/>
+          <p:nvPr/>
+        </p:nvSpPr>
+        <p:spPr>
+          <a:xfrm>
+            <a:off x="2500132" y="2156814"/>
+            <a:ext cx="742511" cy="369332"/>
+          </a:xfrm>
+          <a:prstGeom prst="rect">
+            <a:avLst/>
+          </a:prstGeom>
+          <a:noFill/>
+        </p:spPr>
+        <p:txBody>
+          <a:bodyPr wrap="none" rtlCol="0">
+            <a:spAutoFit/>
+          </a:bodyPr>
+          <a:lstStyle/>
+          <a:p>
+            <a:r>
+              <a:rPr lang="en-GB" dirty="0" err="1" smtClean="0">
+                <a:latin typeface="Roboto Thin" pitchFamily="2" charset="0"/>
+                <a:ea typeface="Roboto Thin" pitchFamily="2" charset="0"/>
+              </a:rPr>
+              <a:t>Redis</a:t>
+            </a:r>
+            <a:endParaRPr lang="en-US" dirty="0">
+              <a:latin typeface="Roboto Thin" pitchFamily="2" charset="0"/>
+              <a:ea typeface="Roboto Thin" pitchFamily="2" charset="0"/>
+            </a:endParaRPr>
+          </a:p>
+        </p:txBody>
+      </p:sp>
+      <p:sp>
+        <p:nvSpPr>
+          <p:cNvPr id="14" name="TextBox 13"/>
+          <p:cNvSpPr txBox="1"/>
+          <p:nvPr/>
+        </p:nvSpPr>
+        <p:spPr>
+          <a:xfrm>
+            <a:off x="2184725" y="1660709"/>
+            <a:ext cx="1273105" cy="369332"/>
+          </a:xfrm>
+          <a:prstGeom prst="rect">
+            <a:avLst/>
+          </a:prstGeom>
+          <a:noFill/>
+        </p:spPr>
+        <p:txBody>
+          <a:bodyPr wrap="none" rtlCol="0">
+            <a:spAutoFit/>
+          </a:bodyPr>
+          <a:lstStyle/>
+          <a:p>
+            <a:r>
+              <a:rPr lang="en-GB" dirty="0" err="1" smtClean="0">
+                <a:latin typeface="Roboto Thin" pitchFamily="2" charset="0"/>
+                <a:ea typeface="Roboto Thin" pitchFamily="2" charset="0"/>
+              </a:rPr>
+              <a:t>EventStore</a:t>
+            </a:r>
+            <a:endParaRPr lang="en-US" dirty="0">
+              <a:latin typeface="Roboto Thin" pitchFamily="2" charset="0"/>
+              <a:ea typeface="Roboto Thin" pitchFamily="2" charset="0"/>
+            </a:endParaRPr>
+          </a:p>
+        </p:txBody>
+      </p:sp>
+      <p:pic>
+        <p:nvPicPr>
+          <p:cNvPr id="2052" name="Picture 4" descr="Image result for API"/>
+          <p:cNvPicPr>
+            <a:picLocks noChangeAspect="1" noChangeArrowheads="1"/>
+          </p:cNvPicPr>
+          <p:nvPr/>
+        </p:nvPicPr>
+        <p:blipFill>
+          <a:blip r:embed="rId4" cstate="print">
+            <a:extLst>
+              <a:ext uri="{28A0092B-C50C-407E-A947-70E740481C1C}">
+                <a14:useLocalDpi xmlns:a14="http://schemas.microsoft.com/office/drawing/2010/main" val="0"/>
+              </a:ext>
+            </a:extLst>
+          </a:blip>
+          <a:srcRect/>
+          <a:stretch>
+            <a:fillRect/>
+          </a:stretch>
+        </p:blipFill>
+        <p:spPr bwMode="auto">
+          <a:xfrm>
+            <a:off x="8815125" y="1744970"/>
+            <a:ext cx="1562352" cy="1562352"/>
+          </a:xfrm>
+          <a:prstGeom prst="rect">
+            <a:avLst/>
+          </a:prstGeom>
+          <a:noFill/>
+          <a:extLst>
+            <a:ext uri="{909E8E84-426E-40DD-AFC4-6F175D3DCCD1}">
+              <a14:hiddenFill xmlns:a14="http://schemas.microsoft.com/office/drawing/2010/main">
+                <a:solidFill>
+                  <a:srgbClr val="FFFFFF"/>
+                </a:solidFill>
+              </a14:hiddenFill>
+            </a:ext>
+          </a:extLst>
+        </p:spPr>
+      </p:pic>
+      <p:sp>
+        <p:nvSpPr>
+          <p:cNvPr id="16" name="TextBox 15"/>
+          <p:cNvSpPr txBox="1"/>
+          <p:nvPr/>
+        </p:nvSpPr>
+        <p:spPr>
+          <a:xfrm>
+            <a:off x="8369171" y="1345308"/>
+            <a:ext cx="1141659" cy="369332"/>
+          </a:xfrm>
+          <a:prstGeom prst="rect">
+            <a:avLst/>
+          </a:prstGeom>
+          <a:noFill/>
+        </p:spPr>
+        <p:txBody>
+          <a:bodyPr wrap="none" rtlCol="0">
+            <a:spAutoFit/>
+          </a:bodyPr>
+          <a:lstStyle/>
+          <a:p>
+            <a:r>
+              <a:rPr lang="en-GB" dirty="0" smtClean="0">
+                <a:latin typeface="Roboto Thin" pitchFamily="2" charset="0"/>
+                <a:ea typeface="Roboto Thin" pitchFamily="2" charset="0"/>
+              </a:rPr>
+              <a:t>AWS ECS</a:t>
+            </a:r>
+            <a:endParaRPr lang="en-US" dirty="0">
+              <a:latin typeface="Roboto Thin" pitchFamily="2" charset="0"/>
+              <a:ea typeface="Roboto Thin" pitchFamily="2" charset="0"/>
+            </a:endParaRPr>
+          </a:p>
+        </p:txBody>
+      </p:sp>
+      <p:sp>
+        <p:nvSpPr>
+          <p:cNvPr id="17" name="TextBox 16"/>
+          <p:cNvSpPr txBox="1"/>
+          <p:nvPr/>
+        </p:nvSpPr>
+        <p:spPr>
+          <a:xfrm>
+            <a:off x="7804977" y="2114302"/>
+            <a:ext cx="1370888" cy="369332"/>
+          </a:xfrm>
+          <a:prstGeom prst="rect">
+            <a:avLst/>
+          </a:prstGeom>
+          <a:noFill/>
+        </p:spPr>
+        <p:txBody>
+          <a:bodyPr wrap="none" rtlCol="0">
+            <a:spAutoFit/>
+          </a:bodyPr>
+          <a:lstStyle/>
+          <a:p>
+            <a:r>
+              <a:rPr lang="en-GB" dirty="0" smtClean="0">
+                <a:latin typeface="Roboto Thin" pitchFamily="2" charset="0"/>
+                <a:ea typeface="Roboto Thin" pitchFamily="2" charset="0"/>
+              </a:rPr>
+              <a:t>AWS Health</a:t>
+            </a:r>
+            <a:endParaRPr lang="en-US" dirty="0">
+              <a:latin typeface="Roboto Thin" pitchFamily="2" charset="0"/>
+              <a:ea typeface="Roboto Thin" pitchFamily="2" charset="0"/>
+            </a:endParaRPr>
+          </a:p>
+        </p:txBody>
+      </p:sp>
+      <p:sp>
+        <p:nvSpPr>
+          <p:cNvPr id="18" name="TextBox 17"/>
+          <p:cNvSpPr txBox="1"/>
+          <p:nvPr/>
+        </p:nvSpPr>
+        <p:spPr>
+          <a:xfrm>
+            <a:off x="7721172" y="2675182"/>
+            <a:ext cx="1197764" cy="369332"/>
+          </a:xfrm>
+          <a:prstGeom prst="rect">
+            <a:avLst/>
+          </a:prstGeom>
+          <a:noFill/>
+        </p:spPr>
+        <p:txBody>
+          <a:bodyPr wrap="none" rtlCol="0">
+            <a:spAutoFit/>
+          </a:bodyPr>
+          <a:lstStyle/>
+          <a:p>
+            <a:r>
+              <a:rPr lang="en-GB" dirty="0" err="1" smtClean="0">
+                <a:latin typeface="Roboto Thin" pitchFamily="2" charset="0"/>
+                <a:ea typeface="Roboto Thin" pitchFamily="2" charset="0"/>
+              </a:rPr>
+              <a:t>Cloudflare</a:t>
+            </a:r>
+            <a:endParaRPr lang="en-US" dirty="0">
+              <a:latin typeface="Roboto Thin" pitchFamily="2" charset="0"/>
+              <a:ea typeface="Roboto Thin" pitchFamily="2" charset="0"/>
+            </a:endParaRPr>
+          </a:p>
+        </p:txBody>
+      </p:sp>
+      <p:sp>
+        <p:nvSpPr>
+          <p:cNvPr id="19" name="TextBox 18"/>
+          <p:cNvSpPr txBox="1"/>
+          <p:nvPr/>
+        </p:nvSpPr>
+        <p:spPr>
+          <a:xfrm>
+            <a:off x="8185644" y="3165168"/>
+            <a:ext cx="1481496" cy="369332"/>
+          </a:xfrm>
+          <a:prstGeom prst="rect">
+            <a:avLst/>
+          </a:prstGeom>
+          <a:noFill/>
+        </p:spPr>
+        <p:txBody>
+          <a:bodyPr wrap="none" rtlCol="0">
+            <a:spAutoFit/>
+          </a:bodyPr>
+          <a:lstStyle/>
+          <a:p>
+            <a:r>
+              <a:rPr lang="en-GB" dirty="0" smtClean="0">
+                <a:latin typeface="Roboto Thin" pitchFamily="2" charset="0"/>
+                <a:ea typeface="Roboto Thin" pitchFamily="2" charset="0"/>
+              </a:rPr>
+              <a:t>Docker cloud</a:t>
+            </a:r>
+            <a:endParaRPr lang="en-US" dirty="0">
+              <a:latin typeface="Roboto Thin" pitchFamily="2" charset="0"/>
+              <a:ea typeface="Roboto Thin" pitchFamily="2" charset="0"/>
+            </a:endParaRPr>
+          </a:p>
+        </p:txBody>
+      </p:sp>
+      <p:sp>
+        <p:nvSpPr>
+          <p:cNvPr id="20" name="TextBox 19"/>
+          <p:cNvSpPr txBox="1"/>
+          <p:nvPr/>
+        </p:nvSpPr>
+        <p:spPr>
+          <a:xfrm>
+            <a:off x="10059105" y="3034582"/>
+            <a:ext cx="1316386" cy="369332"/>
+          </a:xfrm>
+          <a:prstGeom prst="rect">
+            <a:avLst/>
+          </a:prstGeom>
+          <a:noFill/>
+        </p:spPr>
+        <p:txBody>
+          <a:bodyPr wrap="none" rtlCol="0">
+            <a:spAutoFit/>
+          </a:bodyPr>
+          <a:lstStyle/>
+          <a:p>
+            <a:r>
+              <a:rPr lang="en-GB" dirty="0" smtClean="0">
+                <a:latin typeface="Roboto Thin" pitchFamily="2" charset="0"/>
+                <a:ea typeface="Roboto Thin" pitchFamily="2" charset="0"/>
+              </a:rPr>
+              <a:t>Docker hub</a:t>
+            </a:r>
+            <a:endParaRPr lang="en-US" dirty="0">
+              <a:latin typeface="Roboto Thin" pitchFamily="2" charset="0"/>
+              <a:ea typeface="Roboto Thin" pitchFamily="2" charset="0"/>
+            </a:endParaRPr>
+          </a:p>
+        </p:txBody>
+      </p:sp>
+      <p:sp>
+        <p:nvSpPr>
+          <p:cNvPr id="21" name="TextBox 20"/>
+          <p:cNvSpPr txBox="1"/>
+          <p:nvPr/>
+        </p:nvSpPr>
+        <p:spPr>
+          <a:xfrm>
+            <a:off x="9889202" y="1550640"/>
+            <a:ext cx="843501" cy="369332"/>
+          </a:xfrm>
+          <a:prstGeom prst="rect">
+            <a:avLst/>
+          </a:prstGeom>
+          <a:noFill/>
+        </p:spPr>
+        <p:txBody>
+          <a:bodyPr wrap="none" rtlCol="0">
+            <a:spAutoFit/>
+          </a:bodyPr>
+          <a:lstStyle/>
+          <a:p>
+            <a:r>
+              <a:rPr lang="en-GB" dirty="0" err="1" smtClean="0">
+                <a:latin typeface="Roboto Thin" pitchFamily="2" charset="0"/>
+                <a:ea typeface="Roboto Thin" pitchFamily="2" charset="0"/>
+              </a:rPr>
+              <a:t>Github</a:t>
+            </a:r>
+            <a:endParaRPr lang="en-US" dirty="0">
+              <a:latin typeface="Roboto Thin" pitchFamily="2" charset="0"/>
+              <a:ea typeface="Roboto Thin" pitchFamily="2" charset="0"/>
+            </a:endParaRPr>
+          </a:p>
+        </p:txBody>
+      </p:sp>
+      <p:pic>
+        <p:nvPicPr>
+          <p:cNvPr id="2054" name="Picture 6" descr="Image result for message queue"/>
+          <p:cNvPicPr>
+            <a:picLocks noChangeAspect="1" noChangeArrowheads="1"/>
+          </p:cNvPicPr>
+          <p:nvPr/>
+        </p:nvPicPr>
+        <p:blipFill>
+          <a:blip r:embed="rId5">
+            <a:extLst>
+              <a:ext uri="{28A0092B-C50C-407E-A947-70E740481C1C}">
+                <a14:useLocalDpi xmlns:a14="http://schemas.microsoft.com/office/drawing/2010/main" val="0"/>
+              </a:ext>
+            </a:extLst>
+          </a:blip>
+          <a:srcRect/>
+          <a:stretch>
+            <a:fillRect/>
+          </a:stretch>
+        </p:blipFill>
+        <p:spPr bwMode="auto">
+          <a:xfrm>
+            <a:off x="4994023" y="4506281"/>
+            <a:ext cx="2309066" cy="1231503"/>
+          </a:xfrm>
+          <a:prstGeom prst="rect">
+            <a:avLst/>
+          </a:prstGeom>
+          <a:noFill/>
+          <a:extLst>
+            <a:ext uri="{909E8E84-426E-40DD-AFC4-6F175D3DCCD1}">
+              <a14:hiddenFill xmlns:a14="http://schemas.microsoft.com/office/drawing/2010/main">
+                <a:solidFill>
+                  <a:srgbClr val="FFFFFF"/>
+                </a:solidFill>
+              </a14:hiddenFill>
+            </a:ext>
+          </a:extLst>
+        </p:spPr>
+      </p:pic>
+      <p:sp>
+        <p:nvSpPr>
+          <p:cNvPr id="24" name="TextBox 23"/>
+          <p:cNvSpPr txBox="1"/>
+          <p:nvPr/>
+        </p:nvSpPr>
+        <p:spPr>
+          <a:xfrm>
+            <a:off x="3748746" y="5019630"/>
+            <a:ext cx="1181734" cy="369332"/>
+          </a:xfrm>
+          <a:prstGeom prst="rect">
+            <a:avLst/>
+          </a:prstGeom>
+          <a:noFill/>
+        </p:spPr>
+        <p:txBody>
+          <a:bodyPr wrap="none" rtlCol="0">
+            <a:spAutoFit/>
+          </a:bodyPr>
+          <a:lstStyle/>
+          <a:p>
+            <a:r>
+              <a:rPr lang="en-GB" dirty="0" err="1" smtClean="0">
+                <a:latin typeface="Roboto Thin" pitchFamily="2" charset="0"/>
+                <a:ea typeface="Roboto Thin" pitchFamily="2" charset="0"/>
+              </a:rPr>
+              <a:t>RabbitMQ</a:t>
+            </a:r>
+            <a:endParaRPr lang="en-US" dirty="0">
+              <a:latin typeface="Roboto Thin" pitchFamily="2" charset="0"/>
+              <a:ea typeface="Roboto Thin" pitchFamily="2" charset="0"/>
+            </a:endParaRPr>
+          </a:p>
+        </p:txBody>
+      </p:sp>
+      <p:sp>
+        <p:nvSpPr>
+          <p:cNvPr id="25" name="TextBox 24"/>
+          <p:cNvSpPr txBox="1"/>
+          <p:nvPr/>
+        </p:nvSpPr>
+        <p:spPr>
+          <a:xfrm>
+            <a:off x="4124195" y="4154568"/>
+            <a:ext cx="755335" cy="369332"/>
+          </a:xfrm>
+          <a:prstGeom prst="rect">
+            <a:avLst/>
+          </a:prstGeom>
+          <a:noFill/>
+        </p:spPr>
+        <p:txBody>
+          <a:bodyPr wrap="none" rtlCol="0">
+            <a:spAutoFit/>
+          </a:bodyPr>
+          <a:lstStyle/>
+          <a:p>
+            <a:r>
+              <a:rPr lang="en-GB" dirty="0" smtClean="0">
+                <a:latin typeface="Roboto Thin" pitchFamily="2" charset="0"/>
+                <a:ea typeface="Roboto Thin" pitchFamily="2" charset="0"/>
+              </a:rPr>
+              <a:t>Kafka</a:t>
+            </a:r>
+            <a:endParaRPr lang="en-US" dirty="0">
+              <a:latin typeface="Roboto Thin" pitchFamily="2" charset="0"/>
+              <a:ea typeface="Roboto Thin" pitchFamily="2" charset="0"/>
+            </a:endParaRPr>
+          </a:p>
+        </p:txBody>
+      </p:sp>
+      <p:sp>
+        <p:nvSpPr>
+          <p:cNvPr id="26" name="TextBox 25"/>
+          <p:cNvSpPr txBox="1"/>
+          <p:nvPr/>
+        </p:nvSpPr>
+        <p:spPr>
+          <a:xfrm>
+            <a:off x="5208153" y="3969902"/>
+            <a:ext cx="1454244" cy="369332"/>
+          </a:xfrm>
+          <a:prstGeom prst="rect">
+            <a:avLst/>
+          </a:prstGeom>
+          <a:noFill/>
+        </p:spPr>
+        <p:txBody>
+          <a:bodyPr wrap="none" rtlCol="0">
+            <a:spAutoFit/>
+          </a:bodyPr>
+          <a:lstStyle/>
+          <a:p>
+            <a:r>
+              <a:rPr lang="en-GB" dirty="0" err="1" smtClean="0">
+                <a:latin typeface="Roboto Thin" pitchFamily="2" charset="0"/>
+                <a:ea typeface="Roboto Thin" pitchFamily="2" charset="0"/>
+              </a:rPr>
+              <a:t>NServiceBus</a:t>
+            </a:r>
+            <a:endParaRPr lang="en-US" dirty="0">
+              <a:latin typeface="Roboto Thin" pitchFamily="2" charset="0"/>
+              <a:ea typeface="Roboto Thin" pitchFamily="2" charset="0"/>
+            </a:endParaRPr>
+          </a:p>
+        </p:txBody>
+      </p:sp>
+    </p:spTree>
+    <p:extLst>
+      <p:ext uri="{BB962C8B-B14F-4D97-AF65-F5344CB8AC3E}">
+        <p14:creationId xmlns:p14="http://schemas.microsoft.com/office/powerpoint/2010/main" val="2168127531"/>
+      </p:ext>
+    </p:extLst>
+  </p:cSld>
+  <p:clrMapOvr>
+    <a:masterClrMapping/>
+  </p:clrMapOvr>
+  <p:timing>
+    <p:tnLst>
+      <p:par>
+        <p:cTn id="1" dur="indefinite" restart="never" nodeType="tmRoot"/>
+      </p:par>
+    </p:tnLst>
+  </p:timing>
+</p:sld>
+</file>
+
+<file path=ppt/slides/slide22.xml><?xml version="1.0" encoding="utf-8"?>
+<p:sld xmlns:a="http://schemas.openxmlformats.org/drawingml/2006/main" xmlns:r="http://schemas.openxmlformats.org/officeDocument/2006/relationships" xmlns:p="http://schemas.openxmlformats.org/presentationml/2006/main">
+  <p:cSld>
+    <p:spTree>
+      <p:nvGrpSpPr>
+        <p:cNvPr id="1" name=""/>
+        <p:cNvGrpSpPr/>
+        <p:nvPr/>
+      </p:nvGrpSpPr>
+      <p:grpSpPr>
+        <a:xfrm>
+          <a:off x="0" y="0"/>
+          <a:ext cx="0" cy="0"/>
+          <a:chOff x="0" y="0"/>
+          <a:chExt cx="0" cy="0"/>
+        </a:xfrm>
+      </p:grpSpPr>
+      <p:sp>
+        <p:nvSpPr>
+          <p:cNvPr id="2" name="Title 1"/>
+          <p:cNvSpPr>
+            <a:spLocks noGrp="1"/>
+          </p:cNvSpPr>
+          <p:nvPr>
+            <p:ph type="title"/>
+          </p:nvPr>
+        </p:nvSpPr>
+        <p:spPr/>
+        <p:txBody>
+          <a:bodyPr/>
+          <a:lstStyle/>
+          <a:p>
+            <a:r>
+              <a:rPr lang="en-GB" dirty="0" smtClean="0"/>
+              <a:t>Create our own exporter</a:t>
+            </a:r>
+            <a:endParaRPr lang="en-US" dirty="0"/>
+          </a:p>
+        </p:txBody>
+      </p:sp>
+      <p:sp>
+        <p:nvSpPr>
+          <p:cNvPr id="3" name="Content Placeholder 2"/>
+          <p:cNvSpPr>
+            <a:spLocks noGrp="1"/>
+          </p:cNvSpPr>
+          <p:nvPr>
+            <p:ph idx="1"/>
+          </p:nvPr>
+        </p:nvSpPr>
+        <p:spPr/>
+        <p:txBody>
+          <a:bodyPr/>
+          <a:lstStyle/>
+          <a:p>
+            <a:endParaRPr lang="en-US"/>
+          </a:p>
+        </p:txBody>
+      </p:sp>
+    </p:spTree>
+    <p:extLst>
+      <p:ext uri="{BB962C8B-B14F-4D97-AF65-F5344CB8AC3E}">
+        <p14:creationId xmlns:p14="http://schemas.microsoft.com/office/powerpoint/2010/main" val="3911127516"/>
+      </p:ext>
+    </p:extLst>
+  </p:cSld>
+  <p:clrMapOvr>
+    <a:masterClrMapping/>
+  </p:clrMapOvr>
+</p:sld>
+</file>
+
+<file path=ppt/slides/slide23.xml><?xml version="1.0" encoding="utf-8"?>
+<p:sld xmlns:a="http://schemas.openxmlformats.org/drawingml/2006/main" xmlns:r="http://schemas.openxmlformats.org/officeDocument/2006/relationships" xmlns:p="http://schemas.openxmlformats.org/presentationml/2006/main">
+  <p:cSld>
+    <p:spTree>
+      <p:nvGrpSpPr>
+        <p:cNvPr id="1" name=""/>
+        <p:cNvGrpSpPr/>
+        <p:nvPr/>
+      </p:nvGrpSpPr>
+      <p:grpSpPr>
+        <a:xfrm>
+          <a:off x="0" y="0"/>
+          <a:ext cx="0" cy="0"/>
+          <a:chOff x="0" y="0"/>
+          <a:chExt cx="0" cy="0"/>
+        </a:xfrm>
+      </p:grpSpPr>
+      <p:sp>
+        <p:nvSpPr>
+          <p:cNvPr id="2" name="Title 1"/>
+          <p:cNvSpPr>
+            <a:spLocks noGrp="1"/>
+          </p:cNvSpPr>
+          <p:nvPr>
+            <p:ph type="title"/>
+          </p:nvPr>
+        </p:nvSpPr>
+        <p:spPr/>
+        <p:txBody>
+          <a:bodyPr/>
+          <a:lstStyle/>
+          <a:p>
+            <a:r>
+              <a:rPr lang="en-GB" dirty="0" err="1" smtClean="0"/>
+              <a:t>Cadvisor</a:t>
+            </a:r>
+            <a:r>
+              <a:rPr lang="en-GB" dirty="0" smtClean="0"/>
+              <a:t> and node exporter </a:t>
+            </a:r>
+            <a:endParaRPr lang="en-US" dirty="0"/>
+          </a:p>
+        </p:txBody>
+      </p:sp>
+      <p:sp>
+        <p:nvSpPr>
+          <p:cNvPr id="3" name="Content Placeholder 2"/>
+          <p:cNvSpPr>
+            <a:spLocks noGrp="1"/>
+          </p:cNvSpPr>
+          <p:nvPr>
+            <p:ph idx="1"/>
+          </p:nvPr>
+        </p:nvSpPr>
+        <p:spPr/>
+        <p:txBody>
+          <a:bodyPr/>
+          <a:lstStyle/>
+          <a:p>
+            <a:endParaRPr lang="en-US"/>
+          </a:p>
+        </p:txBody>
+      </p:sp>
+    </p:spTree>
+    <p:extLst>
+      <p:ext uri="{BB962C8B-B14F-4D97-AF65-F5344CB8AC3E}">
+        <p14:creationId xmlns:p14="http://schemas.microsoft.com/office/powerpoint/2010/main" val="2600445568"/>
+      </p:ext>
+    </p:extLst>
+  </p:cSld>
+  <p:clrMapOvr>
+    <a:masterClrMapping/>
+  </p:clrMapOvr>
+</p:sld>
+</file>
+
 <file path=ppt/slides/slide24.xml><?xml version="1.0" encoding="utf-8"?>
 <p:sld xmlns:a="http://schemas.openxmlformats.org/drawingml/2006/main" xmlns:r="http://schemas.openxmlformats.org/officeDocument/2006/relationships" xmlns:p="http://schemas.openxmlformats.org/presentationml/2006/main">
   <p:cSld>
@@ -9025,7 +9479,15 @@
           <a:p>
             <a:r>
               <a:rPr lang="en-GB" dirty="0" smtClean="0"/>
-              <a:t>List of exporters</a:t>
+              <a:t>Demo </a:t>
+            </a:r>
+            <a:r>
+              <a:rPr lang="en-GB" dirty="0" err="1" smtClean="0"/>
+              <a:t>cadvisor</a:t>
+            </a:r>
+            <a:r>
+              <a:rPr lang="en-GB" dirty="0" smtClean="0"/>
+              <a:t> and exporter</a:t>
             </a:r>
             <a:endParaRPr lang="en-US" dirty="0"/>
           </a:p>
@@ -9053,7 +9515,7 @@
     </p:spTree>
     <p:extLst>
       <p:ext uri="{BB962C8B-B14F-4D97-AF65-F5344CB8AC3E}">
-        <p14:creationId xmlns:p14="http://schemas.microsoft.com/office/powerpoint/2010/main" val="124675232"/>
+        <p14:creationId xmlns:p14="http://schemas.microsoft.com/office/powerpoint/2010/main" val="2123440699"/>
       </p:ext>
     </p:extLst>
   </p:cSld>
@@ -9096,12 +9558,12 @@
           <a:lstStyle/>
           <a:p>
             <a:r>
+              <a:rPr lang="en-GB" dirty="0" smtClean="0"/>
+              <a:t>Configure </a:t>
+            </a:r>
+            <a:r>
               <a:rPr lang="en-GB" dirty="0" err="1" smtClean="0"/>
-              <a:t>Cadvisor</a:t>
-            </a:r>
-            <a:r>
-              <a:rPr lang="en-GB" dirty="0" smtClean="0"/>
-              <a:t> and node exporter </a:t>
+              <a:t>alertmanager</a:t>
             </a:r>
             <a:endParaRPr lang="en-US" dirty="0"/>
           </a:p>
@@ -9129,7 +9591,7 @@
     </p:spTree>
     <p:extLst>
       <p:ext uri="{BB962C8B-B14F-4D97-AF65-F5344CB8AC3E}">
-        <p14:creationId xmlns:p14="http://schemas.microsoft.com/office/powerpoint/2010/main" val="2600445568"/>
+        <p14:creationId xmlns:p14="http://schemas.microsoft.com/office/powerpoint/2010/main" val="3361381497"/>
       </p:ext>
     </p:extLst>
   </p:cSld>
@@ -9173,15 +9635,7 @@
           <a:p>
             <a:r>
               <a:rPr lang="en-GB" dirty="0" smtClean="0"/>
-              <a:t>Demo </a:t>
-            </a:r>
-            <a:r>
-              <a:rPr lang="en-GB" dirty="0" err="1" smtClean="0"/>
-              <a:t>cadvisor</a:t>
-            </a:r>
-            <a:r>
-              <a:rPr lang="en-GB" dirty="0" smtClean="0"/>
-              <a:t> and exporter</a:t>
+              <a:t>Configure alert rules</a:t>
             </a:r>
             <a:endParaRPr lang="en-US" dirty="0"/>
           </a:p>
@@ -9209,7 +9663,7 @@
     </p:spTree>
     <p:extLst>
       <p:ext uri="{BB962C8B-B14F-4D97-AF65-F5344CB8AC3E}">
-        <p14:creationId xmlns:p14="http://schemas.microsoft.com/office/powerpoint/2010/main" val="2123440699"/>
+        <p14:creationId xmlns:p14="http://schemas.microsoft.com/office/powerpoint/2010/main" val="300400572"/>
       </p:ext>
     </p:extLst>
   </p:cSld>
@@ -9253,11 +9707,7 @@
           <a:p>
             <a:r>
               <a:rPr lang="en-GB" dirty="0" smtClean="0"/>
-              <a:t>Configure </a:t>
-            </a:r>
-            <a:r>
-              <a:rPr lang="en-GB" dirty="0" err="1" smtClean="0"/>
-              <a:t>alertmanager</a:t>
+              <a:t>Demo about alerts</a:t>
             </a:r>
             <a:endParaRPr lang="en-US" dirty="0"/>
           </a:p>
@@ -9285,7 +9735,7 @@
     </p:spTree>
     <p:extLst>
       <p:ext uri="{BB962C8B-B14F-4D97-AF65-F5344CB8AC3E}">
-        <p14:creationId xmlns:p14="http://schemas.microsoft.com/office/powerpoint/2010/main" val="3361381497"/>
+        <p14:creationId xmlns:p14="http://schemas.microsoft.com/office/powerpoint/2010/main" val="3811813053"/>
       </p:ext>
     </p:extLst>
   </p:cSld>
@@ -9329,7 +9779,11 @@
           <a:p>
             <a:r>
               <a:rPr lang="en-GB" dirty="0" smtClean="0"/>
-              <a:t>Configure alert rules</a:t>
+              <a:t>Configure </a:t>
+            </a:r>
+            <a:r>
+              <a:rPr lang="en-GB" dirty="0" err="1" smtClean="0"/>
+              <a:t>grafana</a:t>
             </a:r>
             <a:endParaRPr lang="en-US" dirty="0"/>
           </a:p>
@@ -9357,7 +9811,7 @@
     </p:spTree>
     <p:extLst>
       <p:ext uri="{BB962C8B-B14F-4D97-AF65-F5344CB8AC3E}">
-        <p14:creationId xmlns:p14="http://schemas.microsoft.com/office/powerpoint/2010/main" val="300400572"/>
+        <p14:creationId xmlns:p14="http://schemas.microsoft.com/office/powerpoint/2010/main" val="3939666335"/>
       </p:ext>
     </p:extLst>
   </p:cSld>
@@ -9401,7 +9855,7 @@
           <a:p>
             <a:r>
               <a:rPr lang="en-GB" dirty="0" smtClean="0"/>
-              <a:t>Demo about alerts</a:t>
+              <a:t>Demo create a dashboard</a:t>
             </a:r>
             <a:endParaRPr lang="en-US" dirty="0"/>
           </a:p>
@@ -9429,7 +9883,7 @@
     </p:spTree>
     <p:extLst>
       <p:ext uri="{BB962C8B-B14F-4D97-AF65-F5344CB8AC3E}">
-        <p14:creationId xmlns:p14="http://schemas.microsoft.com/office/powerpoint/2010/main" val="3811813053"/>
+        <p14:creationId xmlns:p14="http://schemas.microsoft.com/office/powerpoint/2010/main" val="3581386613"/>
       </p:ext>
     </p:extLst>
   </p:cSld>
@@ -9551,11 +10005,7 @@
           <a:p>
             <a:r>
               <a:rPr lang="en-GB" dirty="0" smtClean="0"/>
-              <a:t>Configure </a:t>
-            </a:r>
-            <a:r>
-              <a:rPr lang="en-GB" dirty="0" err="1" smtClean="0"/>
-              <a:t>grafana</a:t>
+              <a:t>Demo all together</a:t>
             </a:r>
             <a:endParaRPr lang="en-US" dirty="0"/>
           </a:p>
@@ -9583,7 +10033,7 @@
     </p:spTree>
     <p:extLst>
       <p:ext uri="{BB962C8B-B14F-4D97-AF65-F5344CB8AC3E}">
-        <p14:creationId xmlns:p14="http://schemas.microsoft.com/office/powerpoint/2010/main" val="3939666335"/>
+        <p14:creationId xmlns:p14="http://schemas.microsoft.com/office/powerpoint/2010/main" val="2477266881"/>
       </p:ext>
     </p:extLst>
   </p:cSld>
@@ -9627,7 +10077,7 @@
           <a:p>
             <a:r>
               <a:rPr lang="en-GB" dirty="0" smtClean="0"/>
-              <a:t>Demo create a dashboard</a:t>
+              <a:t>Thank you</a:t>
             </a:r>
             <a:endParaRPr lang="en-US" dirty="0"/>
           </a:p>
@@ -9655,7 +10105,7 @@
     </p:spTree>
     <p:extLst>
       <p:ext uri="{BB962C8B-B14F-4D97-AF65-F5344CB8AC3E}">
-        <p14:creationId xmlns:p14="http://schemas.microsoft.com/office/powerpoint/2010/main" val="3581386613"/>
+        <p14:creationId xmlns:p14="http://schemas.microsoft.com/office/powerpoint/2010/main" val="394125788"/>
       </p:ext>
     </p:extLst>
   </p:cSld>
@@ -9699,222 +10149,6 @@
           <a:p>
             <a:r>
               <a:rPr lang="en-GB" dirty="0" smtClean="0"/>
-              <a:t>Create our own exporter</a:t>
-            </a:r>
-            <a:endParaRPr lang="en-US" dirty="0"/>
-          </a:p>
-        </p:txBody>
-      </p:sp>
-      <p:sp>
-        <p:nvSpPr>
-          <p:cNvPr id="3" name="Content Placeholder 2"/>
-          <p:cNvSpPr>
-            <a:spLocks noGrp="1"/>
-          </p:cNvSpPr>
-          <p:nvPr>
-            <p:ph idx="1"/>
-          </p:nvPr>
-        </p:nvSpPr>
-        <p:spPr/>
-        <p:txBody>
-          <a:bodyPr/>
-          <a:lstStyle/>
-          <a:p>
-            <a:endParaRPr lang="en-US"/>
-          </a:p>
-        </p:txBody>
-      </p:sp>
-    </p:spTree>
-    <p:extLst>
-      <p:ext uri="{BB962C8B-B14F-4D97-AF65-F5344CB8AC3E}">
-        <p14:creationId xmlns:p14="http://schemas.microsoft.com/office/powerpoint/2010/main" val="3911127516"/>
-      </p:ext>
-    </p:extLst>
-  </p:cSld>
-  <p:clrMapOvr>
-    <a:masterClrMapping/>
-  </p:clrMapOvr>
-</p:sld>
-</file>
-
-<file path=ppt/slides/slide33.xml><?xml version="1.0" encoding="utf-8"?>
-<p:sld xmlns:a="http://schemas.openxmlformats.org/drawingml/2006/main" xmlns:r="http://schemas.openxmlformats.org/officeDocument/2006/relationships" xmlns:p="http://schemas.openxmlformats.org/presentationml/2006/main">
-  <p:cSld>
-    <p:spTree>
-      <p:nvGrpSpPr>
-        <p:cNvPr id="1" name=""/>
-        <p:cNvGrpSpPr/>
-        <p:nvPr/>
-      </p:nvGrpSpPr>
-      <p:grpSpPr>
-        <a:xfrm>
-          <a:off x="0" y="0"/>
-          <a:ext cx="0" cy="0"/>
-          <a:chOff x="0" y="0"/>
-          <a:chExt cx="0" cy="0"/>
-        </a:xfrm>
-      </p:grpSpPr>
-      <p:sp>
-        <p:nvSpPr>
-          <p:cNvPr id="2" name="Title 1"/>
-          <p:cNvSpPr>
-            <a:spLocks noGrp="1"/>
-          </p:cNvSpPr>
-          <p:nvPr>
-            <p:ph type="title"/>
-          </p:nvPr>
-        </p:nvSpPr>
-        <p:spPr/>
-        <p:txBody>
-          <a:bodyPr/>
-          <a:lstStyle/>
-          <a:p>
-            <a:r>
-              <a:rPr lang="en-GB" dirty="0" smtClean="0"/>
-              <a:t>Demo all together</a:t>
-            </a:r>
-            <a:endParaRPr lang="en-US" dirty="0"/>
-          </a:p>
-        </p:txBody>
-      </p:sp>
-      <p:sp>
-        <p:nvSpPr>
-          <p:cNvPr id="3" name="Content Placeholder 2"/>
-          <p:cNvSpPr>
-            <a:spLocks noGrp="1"/>
-          </p:cNvSpPr>
-          <p:nvPr>
-            <p:ph idx="1"/>
-          </p:nvPr>
-        </p:nvSpPr>
-        <p:spPr/>
-        <p:txBody>
-          <a:bodyPr/>
-          <a:lstStyle/>
-          <a:p>
-            <a:endParaRPr lang="en-US"/>
-          </a:p>
-        </p:txBody>
-      </p:sp>
-    </p:spTree>
-    <p:extLst>
-      <p:ext uri="{BB962C8B-B14F-4D97-AF65-F5344CB8AC3E}">
-        <p14:creationId xmlns:p14="http://schemas.microsoft.com/office/powerpoint/2010/main" val="2477266881"/>
-      </p:ext>
-    </p:extLst>
-  </p:cSld>
-  <p:clrMapOvr>
-    <a:masterClrMapping/>
-  </p:clrMapOvr>
-</p:sld>
-</file>
-
-<file path=ppt/slides/slide34.xml><?xml version="1.0" encoding="utf-8"?>
-<p:sld xmlns:a="http://schemas.openxmlformats.org/drawingml/2006/main" xmlns:r="http://schemas.openxmlformats.org/officeDocument/2006/relationships" xmlns:p="http://schemas.openxmlformats.org/presentationml/2006/main">
-  <p:cSld>
-    <p:spTree>
-      <p:nvGrpSpPr>
-        <p:cNvPr id="1" name=""/>
-        <p:cNvGrpSpPr/>
-        <p:nvPr/>
-      </p:nvGrpSpPr>
-      <p:grpSpPr>
-        <a:xfrm>
-          <a:off x="0" y="0"/>
-          <a:ext cx="0" cy="0"/>
-          <a:chOff x="0" y="0"/>
-          <a:chExt cx="0" cy="0"/>
-        </a:xfrm>
-      </p:grpSpPr>
-      <p:sp>
-        <p:nvSpPr>
-          <p:cNvPr id="2" name="Title 1"/>
-          <p:cNvSpPr>
-            <a:spLocks noGrp="1"/>
-          </p:cNvSpPr>
-          <p:nvPr>
-            <p:ph type="title"/>
-          </p:nvPr>
-        </p:nvSpPr>
-        <p:spPr/>
-        <p:txBody>
-          <a:bodyPr/>
-          <a:lstStyle/>
-          <a:p>
-            <a:r>
-              <a:rPr lang="en-GB" dirty="0" smtClean="0"/>
-              <a:t>Thank you</a:t>
-            </a:r>
-            <a:endParaRPr lang="en-US" dirty="0"/>
-          </a:p>
-        </p:txBody>
-      </p:sp>
-      <p:sp>
-        <p:nvSpPr>
-          <p:cNvPr id="3" name="Content Placeholder 2"/>
-          <p:cNvSpPr>
-            <a:spLocks noGrp="1"/>
-          </p:cNvSpPr>
-          <p:nvPr>
-            <p:ph idx="1"/>
-          </p:nvPr>
-        </p:nvSpPr>
-        <p:spPr/>
-        <p:txBody>
-          <a:bodyPr/>
-          <a:lstStyle/>
-          <a:p>
-            <a:endParaRPr lang="en-US"/>
-          </a:p>
-        </p:txBody>
-      </p:sp>
-    </p:spTree>
-    <p:extLst>
-      <p:ext uri="{BB962C8B-B14F-4D97-AF65-F5344CB8AC3E}">
-        <p14:creationId xmlns:p14="http://schemas.microsoft.com/office/powerpoint/2010/main" val="394125788"/>
-      </p:ext>
-    </p:extLst>
-  </p:cSld>
-  <p:clrMapOvr>
-    <a:masterClrMapping/>
-  </p:clrMapOvr>
-</p:sld>
-</file>
-
-<file path=ppt/slides/slide35.xml><?xml version="1.0" encoding="utf-8"?>
-<p:sld xmlns:a="http://schemas.openxmlformats.org/drawingml/2006/main" xmlns:r="http://schemas.openxmlformats.org/officeDocument/2006/relationships" xmlns:p="http://schemas.openxmlformats.org/presentationml/2006/main">
-  <p:cSld>
-    <p:spTree>
-      <p:nvGrpSpPr>
-        <p:cNvPr id="1" name=""/>
-        <p:cNvGrpSpPr/>
-        <p:nvPr/>
-      </p:nvGrpSpPr>
-      <p:grpSpPr>
-        <a:xfrm>
-          <a:off x="0" y="0"/>
-          <a:ext cx="0" cy="0"/>
-          <a:chOff x="0" y="0"/>
-          <a:chExt cx="0" cy="0"/>
-        </a:xfrm>
-      </p:grpSpPr>
-      <p:sp>
-        <p:nvSpPr>
-          <p:cNvPr id="2" name="Title 1"/>
-          <p:cNvSpPr>
-            <a:spLocks noGrp="1"/>
-          </p:cNvSpPr>
-          <p:nvPr>
-            <p:ph type="title"/>
-          </p:nvPr>
-        </p:nvSpPr>
-        <p:spPr/>
-        <p:txBody>
-          <a:bodyPr/>
-          <a:lstStyle/>
-          <a:p>
-            <a:r>
-              <a:rPr lang="en-GB" dirty="0" smtClean="0"/>
               <a:t>Questions</a:t>
             </a:r>
             <a:endParaRPr lang="en-US" dirty="0"/>
@@ -9953,7 +10187,7 @@
 </p:sld>
 </file>
 
-<file path=ppt/slides/slide36.xml><?xml version="1.0" encoding="utf-8"?>
+<file path=ppt/slides/slide33.xml><?xml version="1.0" encoding="utf-8"?>
 <p:sld xmlns:a="http://schemas.openxmlformats.org/drawingml/2006/main" xmlns:r="http://schemas.openxmlformats.org/officeDocument/2006/relationships" xmlns:p="http://schemas.openxmlformats.org/presentationml/2006/main">
   <p:cSld>
     <p:spTree>
@@ -10857,84 +11091,6 @@
           <a:chExt cx="0" cy="0"/>
         </a:xfrm>
       </p:grpSpPr>
-      <p:pic>
-        <p:nvPicPr>
-          <p:cNvPr id="3076" name="Picture 4" descr="Image result for peppa pig family"/>
-          <p:cNvPicPr>
-            <a:picLocks noChangeAspect="1" noChangeArrowheads="1"/>
-          </p:cNvPicPr>
-          <p:nvPr/>
-        </p:nvPicPr>
-        <p:blipFill>
-          <a:blip r:embed="rId3">
-            <a:extLst>
-              <a:ext uri="{28A0092B-C50C-407E-A947-70E740481C1C}">
-                <a14:useLocalDpi xmlns:a14="http://schemas.microsoft.com/office/drawing/2010/main" val="0"/>
-              </a:ext>
-            </a:extLst>
-          </a:blip>
-          <a:srcRect/>
-          <a:stretch>
-            <a:fillRect/>
-          </a:stretch>
-        </p:blipFill>
-        <p:spPr bwMode="auto">
-          <a:xfrm>
-            <a:off x="1316105" y="278516"/>
-            <a:ext cx="9559791" cy="6300969"/>
-          </a:xfrm>
-          <a:prstGeom prst="rect">
-            <a:avLst/>
-          </a:prstGeom>
-          <a:noFill/>
-          <a:extLst>
-            <a:ext uri="{909E8E84-426E-40DD-AFC4-6F175D3DCCD1}">
-              <a14:hiddenFill xmlns:a14="http://schemas.microsoft.com/office/drawing/2010/main">
-                <a:solidFill>
-                  <a:srgbClr val="FFFFFF"/>
-                </a:solidFill>
-              </a14:hiddenFill>
-            </a:ext>
-          </a:extLst>
-        </p:spPr>
-      </p:pic>
-    </p:spTree>
-    <p:extLst>
-      <p:ext uri="{BB962C8B-B14F-4D97-AF65-F5344CB8AC3E}">
-        <p14:creationId xmlns:p14="http://schemas.microsoft.com/office/powerpoint/2010/main" val="18639409"/>
-      </p:ext>
-    </p:extLst>
-  </p:cSld>
-  <p:clrMapOvr>
-    <a:masterClrMapping/>
-  </p:clrMapOvr>
-  <p:timing>
-    <p:tnLst>
-      <p:par>
-        <p:cTn id="1" dur="indefinite" restart="never" nodeType="tmRoot"/>
-      </p:par>
-    </p:tnLst>
-  </p:timing>
-</p:sld>
-</file>
-
-<file path=ppt/slides/slide9.xml><?xml version="1.0" encoding="utf-8"?>
-<p:sld xmlns:a="http://schemas.openxmlformats.org/drawingml/2006/main" xmlns:r="http://schemas.openxmlformats.org/officeDocument/2006/relationships" xmlns:p="http://schemas.openxmlformats.org/presentationml/2006/main">
-  <p:cSld>
-    <p:spTree>
-      <p:nvGrpSpPr>
-        <p:cNvPr id="1" name=""/>
-        <p:cNvGrpSpPr/>
-        <p:nvPr/>
-      </p:nvGrpSpPr>
-      <p:grpSpPr>
-        <a:xfrm>
-          <a:off x="0" y="0"/>
-          <a:ext cx="0" cy="0"/>
-          <a:chOff x="0" y="0"/>
-          <a:chExt cx="0" cy="0"/>
-        </a:xfrm>
-      </p:grpSpPr>
       <p:sp>
         <p:nvSpPr>
           <p:cNvPr id="4" name="Rectangle 3"/>
@@ -11068,6 +11224,84 @@
     <p:extLst>
       <p:ext uri="{BB962C8B-B14F-4D97-AF65-F5344CB8AC3E}">
         <p14:creationId xmlns:p14="http://schemas.microsoft.com/office/powerpoint/2010/main" val="1312973878"/>
+      </p:ext>
+    </p:extLst>
+  </p:cSld>
+  <p:clrMapOvr>
+    <a:masterClrMapping/>
+  </p:clrMapOvr>
+  <p:timing>
+    <p:tnLst>
+      <p:par>
+        <p:cTn id="1" dur="indefinite" restart="never" nodeType="tmRoot"/>
+      </p:par>
+    </p:tnLst>
+  </p:timing>
+</p:sld>
+</file>
+
+<file path=ppt/slides/slide9.xml><?xml version="1.0" encoding="utf-8"?>
+<p:sld xmlns:a="http://schemas.openxmlformats.org/drawingml/2006/main" xmlns:r="http://schemas.openxmlformats.org/officeDocument/2006/relationships" xmlns:p="http://schemas.openxmlformats.org/presentationml/2006/main">
+  <p:cSld>
+    <p:spTree>
+      <p:nvGrpSpPr>
+        <p:cNvPr id="1" name=""/>
+        <p:cNvGrpSpPr/>
+        <p:nvPr/>
+      </p:nvGrpSpPr>
+      <p:grpSpPr>
+        <a:xfrm>
+          <a:off x="0" y="0"/>
+          <a:ext cx="0" cy="0"/>
+          <a:chOff x="0" y="0"/>
+          <a:chExt cx="0" cy="0"/>
+        </a:xfrm>
+      </p:grpSpPr>
+      <p:pic>
+        <p:nvPicPr>
+          <p:cNvPr id="1028" name="Picture 4" descr="Related image"/>
+          <p:cNvPicPr>
+            <a:picLocks noChangeAspect="1" noChangeArrowheads="1"/>
+          </p:cNvPicPr>
+          <p:nvPr/>
+        </p:nvPicPr>
+        <p:blipFill>
+          <a:blip r:embed="rId3">
+            <a:extLst>
+              <a:ext uri="{28A0092B-C50C-407E-A947-70E740481C1C}">
+                <a14:useLocalDpi xmlns:a14="http://schemas.microsoft.com/office/drawing/2010/main" val="0"/>
+              </a:ext>
+            </a:extLst>
+          </a:blip>
+          <a:srcRect/>
+          <a:stretch>
+            <a:fillRect/>
+          </a:stretch>
+        </p:blipFill>
+        <p:spPr bwMode="auto">
+          <a:xfrm>
+            <a:off x="-1" y="0"/>
+            <a:ext cx="12683869" cy="7024914"/>
+          </a:xfrm>
+          <a:prstGeom prst="rect">
+            <a:avLst/>
+          </a:prstGeom>
+          <a:noFill/>
+          <a:extLst>
+            <a:ext uri="{909E8E84-426E-40DD-AFC4-6F175D3DCCD1}">
+              <a14:hiddenFill xmlns:a14="http://schemas.microsoft.com/office/drawing/2010/main">
+                <a:solidFill>
+                  <a:srgbClr val="FFFFFF"/>
+                </a:solidFill>
+              </a14:hiddenFill>
+            </a:ext>
+          </a:extLst>
+        </p:spPr>
+      </p:pic>
+    </p:spTree>
+    <p:extLst>
+      <p:ext uri="{BB962C8B-B14F-4D97-AF65-F5344CB8AC3E}">
+        <p14:creationId xmlns:p14="http://schemas.microsoft.com/office/powerpoint/2010/main" val="4206498647"/>
       </p:ext>
     </p:extLst>
   </p:cSld>

</xml_diff>